<commit_message>
Quick Removal of Redundant Tech Stack
</commit_message>
<xml_diff>
--- a/Powerpoint Documents/TechnoBabel_Introduction_Presentation.pptx
+++ b/Powerpoint Documents/TechnoBabel_Introduction_Presentation.pptx
@@ -1,32 +1,32 @@
 
 <file path=ppt/presentation.xml><?xml version="1.0" encoding="utf-8"?>
-<p:presentation xmlns:a="http://schemas.openxmlformats.org/drawingml/2006/main" xmlns:r="http://schemas.openxmlformats.org/officeDocument/2006/relationships" xmlns:mc="http://schemas.openxmlformats.org/markup-compatibility/2006" xmlns:mv="urn:schemas-microsoft-com:mac:vml" xmlns:p="http://schemas.openxmlformats.org/presentationml/2006/main" xmlns:c="http://schemas.openxmlformats.org/drawingml/2006/chart" xmlns:dgm="http://schemas.openxmlformats.org/drawingml/2006/diagram" xmlns:o="urn:schemas-microsoft-com:office:office" xmlns:v="urn:schemas-microsoft-com:vml" xmlns:pvml="urn:schemas-microsoft-com:office:powerpoint" xmlns:com="http://schemas.openxmlformats.org/drawingml/2006/compatibility" xmlns:p14="http://schemas.microsoft.com/office/powerpoint/2010/main" xmlns:p15="http://schemas.microsoft.com/office/powerpoint/2012/main" autoCompressPictures="0" embedTrueTypeFonts="1" strictFirstAndLastChars="0" saveSubsetFonts="1">
+<p:presentation xmlns:a="http://schemas.openxmlformats.org/drawingml/2006/main" xmlns:r="http://schemas.openxmlformats.org/officeDocument/2006/relationships" xmlns:p="http://schemas.openxmlformats.org/presentationml/2006/main" strictFirstAndLastChars="0" embedTrueTypeFonts="1" saveSubsetFonts="1" autoCompressPictures="0">
   <p:sldMasterIdLst>
-    <p:sldMasterId id="2147483659" r:id="rId3"/>
+    <p:sldMasterId id="2147483659" r:id="rId1"/>
   </p:sldMasterIdLst>
   <p:notesMasterIdLst>
-    <p:notesMasterId r:id="rId4"/>
+    <p:notesMasterId r:id="rId8"/>
   </p:notesMasterIdLst>
   <p:sldIdLst>
-    <p:sldId id="256" r:id="rId5"/>
-    <p:sldId id="257" r:id="rId6"/>
-    <p:sldId id="258" r:id="rId7"/>
-    <p:sldId id="259" r:id="rId8"/>
-    <p:sldId id="260" r:id="rId9"/>
-    <p:sldId id="261" r:id="rId10"/>
+    <p:sldId id="256" r:id="rId2"/>
+    <p:sldId id="257" r:id="rId3"/>
+    <p:sldId id="258" r:id="rId4"/>
+    <p:sldId id="259" r:id="rId5"/>
+    <p:sldId id="260" r:id="rId6"/>
+    <p:sldId id="261" r:id="rId7"/>
   </p:sldIdLst>
-  <p:sldSz cy="5143500" cx="9144000"/>
+  <p:sldSz cx="9144000" cy="5143500" type="screen16x9"/>
   <p:notesSz cx="6858000" cy="9144000"/>
   <p:embeddedFontLst>
     <p:embeddedFont>
-      <p:font typeface="Old Standard TT"/>
-      <p:regular r:id="rId11"/>
-      <p:bold r:id="rId12"/>
-      <p:italic r:id="rId13"/>
+      <p:font typeface="Old Standard TT" panose="020B0604020202020204" charset="0"/>
+      <p:regular r:id="rId9"/>
+      <p:bold r:id="rId10"/>
+      <p:italic r:id="rId11"/>
     </p:embeddedFont>
   </p:embeddedFontLst>
   <p:defaultTextStyle>
-    <a:defPPr lvl="0" marR="0" rtl="0" algn="l">
+    <a:defPPr marR="0" lvl="0" algn="l" rtl="0">
       <a:lnSpc>
         <a:spcPct val="100000"/>
       </a:lnSpc>
@@ -37,7 +37,7 @@
         <a:spcPts val="0"/>
       </a:spcAft>
     </a:defPPr>
-    <a:lvl1pPr lvl="0" marR="0" rtl="0" algn="l">
+    <a:lvl1pPr marR="0" lvl="0" algn="l" rtl="0">
       <a:lnSpc>
         <a:spcPct val="100000"/>
       </a:lnSpc>
@@ -48,7 +48,7 @@
         <a:spcPts val="0"/>
       </a:spcAft>
       <a:buNone/>
-      <a:defRPr b="0" i="0" sz="1400" u="none" cap="none" strike="noStrike">
+      <a:defRPr sz="1400" b="0" i="0" u="none" strike="noStrike" cap="none">
         <a:solidFill>
           <a:srgbClr val="000000"/>
         </a:solidFill>
@@ -58,7 +58,7 @@
         <a:sym typeface="Arial"/>
       </a:defRPr>
     </a:lvl1pPr>
-    <a:lvl2pPr lvl="1" marR="0" rtl="0" algn="l">
+    <a:lvl2pPr marR="0" lvl="1" algn="l" rtl="0">
       <a:lnSpc>
         <a:spcPct val="100000"/>
       </a:lnSpc>
@@ -69,7 +69,7 @@
         <a:spcPts val="0"/>
       </a:spcAft>
       <a:buNone/>
-      <a:defRPr b="0" i="0" sz="1400" u="none" cap="none" strike="noStrike">
+      <a:defRPr sz="1400" b="0" i="0" u="none" strike="noStrike" cap="none">
         <a:solidFill>
           <a:srgbClr val="000000"/>
         </a:solidFill>
@@ -79,7 +79,7 @@
         <a:sym typeface="Arial"/>
       </a:defRPr>
     </a:lvl2pPr>
-    <a:lvl3pPr lvl="2" marR="0" rtl="0" algn="l">
+    <a:lvl3pPr marR="0" lvl="2" algn="l" rtl="0">
       <a:lnSpc>
         <a:spcPct val="100000"/>
       </a:lnSpc>
@@ -90,7 +90,7 @@
         <a:spcPts val="0"/>
       </a:spcAft>
       <a:buNone/>
-      <a:defRPr b="0" i="0" sz="1400" u="none" cap="none" strike="noStrike">
+      <a:defRPr sz="1400" b="0" i="0" u="none" strike="noStrike" cap="none">
         <a:solidFill>
           <a:srgbClr val="000000"/>
         </a:solidFill>
@@ -100,7 +100,7 @@
         <a:sym typeface="Arial"/>
       </a:defRPr>
     </a:lvl3pPr>
-    <a:lvl4pPr lvl="3" marR="0" rtl="0" algn="l">
+    <a:lvl4pPr marR="0" lvl="3" algn="l" rtl="0">
       <a:lnSpc>
         <a:spcPct val="100000"/>
       </a:lnSpc>
@@ -111,7 +111,7 @@
         <a:spcPts val="0"/>
       </a:spcAft>
       <a:buNone/>
-      <a:defRPr b="0" i="0" sz="1400" u="none" cap="none" strike="noStrike">
+      <a:defRPr sz="1400" b="0" i="0" u="none" strike="noStrike" cap="none">
         <a:solidFill>
           <a:srgbClr val="000000"/>
         </a:solidFill>
@@ -121,7 +121,7 @@
         <a:sym typeface="Arial"/>
       </a:defRPr>
     </a:lvl4pPr>
-    <a:lvl5pPr lvl="4" marR="0" rtl="0" algn="l">
+    <a:lvl5pPr marR="0" lvl="4" algn="l" rtl="0">
       <a:lnSpc>
         <a:spcPct val="100000"/>
       </a:lnSpc>
@@ -132,7 +132,7 @@
         <a:spcPts val="0"/>
       </a:spcAft>
       <a:buNone/>
-      <a:defRPr b="0" i="0" sz="1400" u="none" cap="none" strike="noStrike">
+      <a:defRPr sz="1400" b="0" i="0" u="none" strike="noStrike" cap="none">
         <a:solidFill>
           <a:srgbClr val="000000"/>
         </a:solidFill>
@@ -142,7 +142,7 @@
         <a:sym typeface="Arial"/>
       </a:defRPr>
     </a:lvl5pPr>
-    <a:lvl6pPr lvl="5" marR="0" rtl="0" algn="l">
+    <a:lvl6pPr marR="0" lvl="5" algn="l" rtl="0">
       <a:lnSpc>
         <a:spcPct val="100000"/>
       </a:lnSpc>
@@ -153,7 +153,7 @@
         <a:spcPts val="0"/>
       </a:spcAft>
       <a:buNone/>
-      <a:defRPr b="0" i="0" sz="1400" u="none" cap="none" strike="noStrike">
+      <a:defRPr sz="1400" b="0" i="0" u="none" strike="noStrike" cap="none">
         <a:solidFill>
           <a:srgbClr val="000000"/>
         </a:solidFill>
@@ -163,7 +163,7 @@
         <a:sym typeface="Arial"/>
       </a:defRPr>
     </a:lvl6pPr>
-    <a:lvl7pPr lvl="6" marR="0" rtl="0" algn="l">
+    <a:lvl7pPr marR="0" lvl="6" algn="l" rtl="0">
       <a:lnSpc>
         <a:spcPct val="100000"/>
       </a:lnSpc>
@@ -174,7 +174,7 @@
         <a:spcPts val="0"/>
       </a:spcAft>
       <a:buNone/>
-      <a:defRPr b="0" i="0" sz="1400" u="none" cap="none" strike="noStrike">
+      <a:defRPr sz="1400" b="0" i="0" u="none" strike="noStrike" cap="none">
         <a:solidFill>
           <a:srgbClr val="000000"/>
         </a:solidFill>
@@ -184,7 +184,7 @@
         <a:sym typeface="Arial"/>
       </a:defRPr>
     </a:lvl7pPr>
-    <a:lvl8pPr lvl="7" marR="0" rtl="0" algn="l">
+    <a:lvl8pPr marR="0" lvl="7" algn="l" rtl="0">
       <a:lnSpc>
         <a:spcPct val="100000"/>
       </a:lnSpc>
@@ -195,7 +195,7 @@
         <a:spcPts val="0"/>
       </a:spcAft>
       <a:buNone/>
-      <a:defRPr b="0" i="0" sz="1400" u="none" cap="none" strike="noStrike">
+      <a:defRPr sz="1400" b="0" i="0" u="none" strike="noStrike" cap="none">
         <a:solidFill>
           <a:srgbClr val="000000"/>
         </a:solidFill>
@@ -205,7 +205,7 @@
         <a:sym typeface="Arial"/>
       </a:defRPr>
     </a:lvl8pPr>
-    <a:lvl9pPr lvl="8" marR="0" rtl="0" algn="l">
+    <a:lvl9pPr marR="0" lvl="8" algn="l" rtl="0">
       <a:lnSpc>
         <a:spcPct val="100000"/>
       </a:lnSpc>
@@ -216,7 +216,7 @@
         <a:spcPts val="0"/>
       </a:spcAft>
       <a:buNone/>
-      <a:defRPr b="0" i="0" sz="1400" u="none" cap="none" strike="noStrike">
+      <a:defRPr sz="1400" b="0" i="0" u="none" strike="noStrike" cap="none">
         <a:solidFill>
           <a:srgbClr val="000000"/>
         </a:solidFill>
@@ -230,12 +230,21 @@
 </p:presentation>
 </file>
 
+<file path=ppt/revisionInfo.xml><?xml version="1.0" encoding="utf-8"?>
+<p1510:revInfo xmlns:a="http://schemas.openxmlformats.org/drawingml/2006/main" xmlns:r="http://schemas.openxmlformats.org/officeDocument/2006/relationships" xmlns:p1510="http://schemas.microsoft.com/office/powerpoint/2015/10/main"/>
+</file>
+
 <file path=ppt/notesMasters/notesMaster1.xml><?xml version="1.0" encoding="utf-8"?>
-<p:notesMaster xmlns:a="http://schemas.openxmlformats.org/drawingml/2006/main" xmlns:r="http://schemas.openxmlformats.org/officeDocument/2006/relationships" xmlns:mc="http://schemas.openxmlformats.org/markup-compatibility/2006" xmlns:mv="urn:schemas-microsoft-com:mac:vml" xmlns:p="http://schemas.openxmlformats.org/presentationml/2006/main" xmlns:c="http://schemas.openxmlformats.org/drawingml/2006/chart" xmlns:dgm="http://schemas.openxmlformats.org/drawingml/2006/diagram" xmlns:o="urn:schemas-microsoft-com:office:office" xmlns:v="urn:schemas-microsoft-com:vml" xmlns:pvml="urn:schemas-microsoft-com:office:powerpoint" xmlns:com="http://schemas.openxmlformats.org/drawingml/2006/compatibility" xmlns:p14="http://schemas.microsoft.com/office/powerpoint/2010/main" xmlns:p15="http://schemas.microsoft.com/office/powerpoint/2012/main">
+<p:notesMaster xmlns:a="http://schemas.openxmlformats.org/drawingml/2006/main" xmlns:r="http://schemas.openxmlformats.org/officeDocument/2006/relationships" xmlns:p="http://schemas.openxmlformats.org/presentationml/2006/main">
   <p:cSld>
+    <p:bg>
+      <p:bgRef idx="1001">
+        <a:schemeClr val="bg1"/>
+      </p:bgRef>
+    </p:bg>
     <p:spTree>
       <p:nvGrpSpPr>
-        <p:cNvPr id="2" name="Shape 2"/>
+        <p:cNvPr id="1" name="Shape 2"/>
         <p:cNvGrpSpPr/>
         <p:nvPr/>
       </p:nvGrpSpPr>
@@ -250,9 +259,11 @@
       <p:sp>
         <p:nvSpPr>
           <p:cNvPr id="3" name="Shape 3"/>
-          <p:cNvSpPr/>
+          <p:cNvSpPr>
+            <a:spLocks noGrp="1" noRot="1" noChangeAspect="1"/>
+          </p:cNvSpPr>
           <p:nvPr>
-            <p:ph idx="2" type="sldImg"/>
+            <p:ph type="sldImg" idx="2"/>
           </p:nvPr>
         </p:nvSpPr>
         <p:spPr>
@@ -261,8 +272,13 @@
             <a:ext cx="6096075" cy="3429000"/>
           </a:xfrm>
           <a:custGeom>
+            <a:avLst/>
+            <a:gdLst/>
+            <a:ahLst/>
+            <a:cxnLst/>
+            <a:rect l="0" t="0" r="0" b="0"/>
             <a:pathLst>
-              <a:path extrusionOk="0" h="120000" w="120000">
+              <a:path w="120000" h="120000" extrusionOk="0">
                 <a:moveTo>
                   <a:pt x="0" y="0"/>
                 </a:moveTo>
@@ -280,23 +296,25 @@
             </a:pathLst>
           </a:custGeom>
           <a:noFill/>
-          <a:ln cap="flat" cmpd="sng" w="9525">
+          <a:ln w="9525" cap="flat" cmpd="sng">
             <a:solidFill>
               <a:srgbClr val="000000"/>
             </a:solidFill>
             <a:prstDash val="solid"/>
             <a:round/>
-            <a:headEnd len="med" w="med" type="none"/>
-            <a:tailEnd len="med" w="med" type="none"/>
+            <a:headEnd type="none" w="med" len="med"/>
+            <a:tailEnd type="none" w="med" len="med"/>
           </a:ln>
         </p:spPr>
       </p:sp>
       <p:sp>
         <p:nvSpPr>
           <p:cNvPr id="4" name="Shape 4"/>
-          <p:cNvSpPr txBox="1"/>
+          <p:cNvSpPr txBox="1">
+            <a:spLocks noGrp="1"/>
+          </p:cNvSpPr>
           <p:nvPr>
-            <p:ph idx="1" type="body"/>
+            <p:ph type="body" idx="1"/>
           </p:nvPr>
         </p:nvSpPr>
         <p:spPr>
@@ -313,7 +331,7 @@
           </a:ln>
         </p:spPr>
         <p:txBody>
-          <a:bodyPr anchorCtr="0" anchor="t" bIns="91425" lIns="91425" rIns="91425" wrap="square" tIns="91425"/>
+          <a:bodyPr wrap="square" lIns="91425" tIns="91425" rIns="91425" bIns="91425" anchor="t" anchorCtr="0"/>
           <a:lstStyle>
             <a:lvl1pPr lvl="0">
               <a:spcBef>
@@ -388,21 +406,115 @@
               <a:defRPr sz="1100"/>
             </a:lvl9pPr>
           </a:lstStyle>
-          <a:p/>
+          <a:p>
+            <a:endParaRPr/>
+          </a:p>
         </p:txBody>
       </p:sp>
     </p:spTree>
   </p:cSld>
-  <p:clrMap accent1="accent1" accent2="accent2" accent3="accent3" accent4="accent4" accent5="accent5" accent6="accent6" bg1="lt1" bg2="dk2" tx1="dk1" tx2="lt2" folHlink="folHlink" hlink="hlink"/>
+  <p:clrMap bg1="lt1" tx1="dk1" bg2="dk2" tx2="lt2" accent1="accent1" accent2="accent2" accent3="accent3" accent4="accent4" accent5="accent5" accent6="accent6" hlink="hlink" folHlink="folHlink"/>
+  <p:notesStyle>
+    <a:lvl1pPr marL="0" algn="l" defTabSz="914400" rtl="0" eaLnBrk="1" latinLnBrk="0" hangingPunct="1">
+      <a:defRPr sz="1200" kern="1200">
+        <a:solidFill>
+          <a:schemeClr val="tx1"/>
+        </a:solidFill>
+        <a:latin typeface="+mn-lt"/>
+        <a:ea typeface="+mn-ea"/>
+        <a:cs typeface="+mn-cs"/>
+      </a:defRPr>
+    </a:lvl1pPr>
+    <a:lvl2pPr marL="457200" algn="l" defTabSz="914400" rtl="0" eaLnBrk="1" latinLnBrk="0" hangingPunct="1">
+      <a:defRPr sz="1200" kern="1200">
+        <a:solidFill>
+          <a:schemeClr val="tx1"/>
+        </a:solidFill>
+        <a:latin typeface="+mn-lt"/>
+        <a:ea typeface="+mn-ea"/>
+        <a:cs typeface="+mn-cs"/>
+      </a:defRPr>
+    </a:lvl2pPr>
+    <a:lvl3pPr marL="914400" algn="l" defTabSz="914400" rtl="0" eaLnBrk="1" latinLnBrk="0" hangingPunct="1">
+      <a:defRPr sz="1200" kern="1200">
+        <a:solidFill>
+          <a:schemeClr val="tx1"/>
+        </a:solidFill>
+        <a:latin typeface="+mn-lt"/>
+        <a:ea typeface="+mn-ea"/>
+        <a:cs typeface="+mn-cs"/>
+      </a:defRPr>
+    </a:lvl3pPr>
+    <a:lvl4pPr marL="1371600" algn="l" defTabSz="914400" rtl="0" eaLnBrk="1" latinLnBrk="0" hangingPunct="1">
+      <a:defRPr sz="1200" kern="1200">
+        <a:solidFill>
+          <a:schemeClr val="tx1"/>
+        </a:solidFill>
+        <a:latin typeface="+mn-lt"/>
+        <a:ea typeface="+mn-ea"/>
+        <a:cs typeface="+mn-cs"/>
+      </a:defRPr>
+    </a:lvl4pPr>
+    <a:lvl5pPr marL="1828800" algn="l" defTabSz="914400" rtl="0" eaLnBrk="1" latinLnBrk="0" hangingPunct="1">
+      <a:defRPr sz="1200" kern="1200">
+        <a:solidFill>
+          <a:schemeClr val="tx1"/>
+        </a:solidFill>
+        <a:latin typeface="+mn-lt"/>
+        <a:ea typeface="+mn-ea"/>
+        <a:cs typeface="+mn-cs"/>
+      </a:defRPr>
+    </a:lvl5pPr>
+    <a:lvl6pPr marL="2286000" algn="l" defTabSz="914400" rtl="0" eaLnBrk="1" latinLnBrk="0" hangingPunct="1">
+      <a:defRPr sz="1200" kern="1200">
+        <a:solidFill>
+          <a:schemeClr val="tx1"/>
+        </a:solidFill>
+        <a:latin typeface="+mn-lt"/>
+        <a:ea typeface="+mn-ea"/>
+        <a:cs typeface="+mn-cs"/>
+      </a:defRPr>
+    </a:lvl6pPr>
+    <a:lvl7pPr marL="2743200" algn="l" defTabSz="914400" rtl="0" eaLnBrk="1" latinLnBrk="0" hangingPunct="1">
+      <a:defRPr sz="1200" kern="1200">
+        <a:solidFill>
+          <a:schemeClr val="tx1"/>
+        </a:solidFill>
+        <a:latin typeface="+mn-lt"/>
+        <a:ea typeface="+mn-ea"/>
+        <a:cs typeface="+mn-cs"/>
+      </a:defRPr>
+    </a:lvl7pPr>
+    <a:lvl8pPr marL="3200400" algn="l" defTabSz="914400" rtl="0" eaLnBrk="1" latinLnBrk="0" hangingPunct="1">
+      <a:defRPr sz="1200" kern="1200">
+        <a:solidFill>
+          <a:schemeClr val="tx1"/>
+        </a:solidFill>
+        <a:latin typeface="+mn-lt"/>
+        <a:ea typeface="+mn-ea"/>
+        <a:cs typeface="+mn-cs"/>
+      </a:defRPr>
+    </a:lvl8pPr>
+    <a:lvl9pPr marL="3657600" algn="l" defTabSz="914400" rtl="0" eaLnBrk="1" latinLnBrk="0" hangingPunct="1">
+      <a:defRPr sz="1200" kern="1200">
+        <a:solidFill>
+          <a:schemeClr val="tx1"/>
+        </a:solidFill>
+        <a:latin typeface="+mn-lt"/>
+        <a:ea typeface="+mn-ea"/>
+        <a:cs typeface="+mn-cs"/>
+      </a:defRPr>
+    </a:lvl9pPr>
+  </p:notesStyle>
 </p:notesMaster>
 </file>
 
 <file path=ppt/notesSlides/notesSlide1.xml><?xml version="1.0" encoding="utf-8"?>
-<p:notes xmlns:a="http://schemas.openxmlformats.org/drawingml/2006/main" xmlns:r="http://schemas.openxmlformats.org/officeDocument/2006/relationships" xmlns:mc="http://schemas.openxmlformats.org/markup-compatibility/2006" xmlns:mv="urn:schemas-microsoft-com:mac:vml" xmlns:p="http://schemas.openxmlformats.org/presentationml/2006/main" xmlns:c="http://schemas.openxmlformats.org/drawingml/2006/chart" xmlns:dgm="http://schemas.openxmlformats.org/drawingml/2006/diagram" xmlns:o="urn:schemas-microsoft-com:office:office" xmlns:v="urn:schemas-microsoft-com:vml" xmlns:pvml="urn:schemas-microsoft-com:office:powerpoint" xmlns:com="http://schemas.openxmlformats.org/drawingml/2006/compatibility" xmlns:p14="http://schemas.microsoft.com/office/powerpoint/2010/main" xmlns:p15="http://schemas.microsoft.com/office/powerpoint/2012/main" showMasterPhAnim="0" showMasterSp="0">
+<p:notes xmlns:a="http://schemas.openxmlformats.org/drawingml/2006/main" xmlns:r="http://schemas.openxmlformats.org/officeDocument/2006/relationships" xmlns:p="http://schemas.openxmlformats.org/presentationml/2006/main" showMasterSp="0" showMasterPhAnim="0">
   <p:cSld>
     <p:spTree>
       <p:nvGrpSpPr>
-        <p:cNvPr id="55" name="Shape 55"/>
+        <p:cNvPr id="1" name="Shape 55"/>
         <p:cNvGrpSpPr/>
         <p:nvPr/>
       </p:nvGrpSpPr>
@@ -417,19 +529,26 @@
       <p:sp>
         <p:nvSpPr>
           <p:cNvPr id="56" name="Shape 56"/>
-          <p:cNvSpPr/>
+          <p:cNvSpPr>
+            <a:spLocks noGrp="1" noRot="1" noChangeAspect="1"/>
+          </p:cNvSpPr>
           <p:nvPr>
-            <p:ph idx="2" type="sldImg"/>
+            <p:ph type="sldImg" idx="2"/>
           </p:nvPr>
         </p:nvSpPr>
         <p:spPr>
           <a:xfrm>
-            <a:off x="381300" y="685800"/>
-            <a:ext cx="6096075" cy="3429000"/>
+            <a:off x="381000" y="685800"/>
+            <a:ext cx="6096000" cy="3429000"/>
           </a:xfrm>
           <a:custGeom>
+            <a:avLst/>
+            <a:gdLst/>
+            <a:ahLst/>
+            <a:cxnLst/>
+            <a:rect l="0" t="0" r="0" b="0"/>
             <a:pathLst>
-              <a:path extrusionOk="0" h="120000" w="120000">
+              <a:path w="120000" h="120000" extrusionOk="0">
                 <a:moveTo>
                   <a:pt x="0" y="0"/>
                 </a:moveTo>
@@ -451,9 +570,11 @@
       <p:sp>
         <p:nvSpPr>
           <p:cNvPr id="57" name="Shape 57"/>
-          <p:cNvSpPr txBox="1"/>
+          <p:cNvSpPr txBox="1">
+            <a:spLocks noGrp="1"/>
+          </p:cNvSpPr>
           <p:nvPr>
-            <p:ph idx="1" type="body"/>
+            <p:ph type="body" idx="1"/>
           </p:nvPr>
         </p:nvSpPr>
         <p:spPr>
@@ -466,7 +587,7 @@
           </a:prstGeom>
         </p:spPr>
         <p:txBody>
-          <a:bodyPr anchorCtr="0" anchor="t" bIns="91425" lIns="91425" rIns="91425" wrap="square" tIns="91425">
+          <a:bodyPr wrap="square" lIns="91425" tIns="91425" rIns="91425" bIns="91425" anchor="t" anchorCtr="0">
             <a:noAutofit/>
           </a:bodyPr>
           <a:lstStyle/>
@@ -477,9 +598,6 @@
               </a:spcBef>
               <a:buNone/>
             </a:pPr>
-            <a:r>
-              <a:t/>
-            </a:r>
             <a:endParaRPr/>
           </a:p>
         </p:txBody>
@@ -493,11 +611,11 @@
 </file>
 
 <file path=ppt/notesSlides/notesSlide2.xml><?xml version="1.0" encoding="utf-8"?>
-<p:notes xmlns:a="http://schemas.openxmlformats.org/drawingml/2006/main" xmlns:r="http://schemas.openxmlformats.org/officeDocument/2006/relationships" xmlns:mc="http://schemas.openxmlformats.org/markup-compatibility/2006" xmlns:mv="urn:schemas-microsoft-com:mac:vml" xmlns:p="http://schemas.openxmlformats.org/presentationml/2006/main" xmlns:c="http://schemas.openxmlformats.org/drawingml/2006/chart" xmlns:dgm="http://schemas.openxmlformats.org/drawingml/2006/diagram" xmlns:o="urn:schemas-microsoft-com:office:office" xmlns:v="urn:schemas-microsoft-com:vml" xmlns:pvml="urn:schemas-microsoft-com:office:powerpoint" xmlns:com="http://schemas.openxmlformats.org/drawingml/2006/compatibility" xmlns:p14="http://schemas.microsoft.com/office/powerpoint/2010/main" xmlns:p15="http://schemas.microsoft.com/office/powerpoint/2012/main" showMasterPhAnim="0" showMasterSp="0">
+<p:notes xmlns:a="http://schemas.openxmlformats.org/drawingml/2006/main" xmlns:r="http://schemas.openxmlformats.org/officeDocument/2006/relationships" xmlns:p="http://schemas.openxmlformats.org/presentationml/2006/main" showMasterSp="0" showMasterPhAnim="0">
   <p:cSld>
     <p:spTree>
       <p:nvGrpSpPr>
-        <p:cNvPr id="60" name="Shape 60"/>
+        <p:cNvPr id="1" name="Shape 60"/>
         <p:cNvGrpSpPr/>
         <p:nvPr/>
       </p:nvGrpSpPr>
@@ -512,19 +630,26 @@
       <p:sp>
         <p:nvSpPr>
           <p:cNvPr id="61" name="Shape 61"/>
-          <p:cNvSpPr/>
+          <p:cNvSpPr>
+            <a:spLocks noGrp="1" noRot="1" noChangeAspect="1"/>
+          </p:cNvSpPr>
           <p:nvPr>
-            <p:ph idx="2" type="sldImg"/>
+            <p:ph type="sldImg" idx="2"/>
           </p:nvPr>
         </p:nvSpPr>
         <p:spPr>
           <a:xfrm>
-            <a:off x="381300" y="685800"/>
+            <a:off x="381000" y="685800"/>
             <a:ext cx="6096000" cy="3429000"/>
           </a:xfrm>
           <a:custGeom>
+            <a:avLst/>
+            <a:gdLst/>
+            <a:ahLst/>
+            <a:cxnLst/>
+            <a:rect l="0" t="0" r="0" b="0"/>
             <a:pathLst>
-              <a:path extrusionOk="0" h="120000" w="120000">
+              <a:path w="120000" h="120000" extrusionOk="0">
                 <a:moveTo>
                   <a:pt x="0" y="0"/>
                 </a:moveTo>
@@ -546,9 +671,11 @@
       <p:sp>
         <p:nvSpPr>
           <p:cNvPr id="62" name="Shape 62"/>
-          <p:cNvSpPr txBox="1"/>
+          <p:cNvSpPr txBox="1">
+            <a:spLocks noGrp="1"/>
+          </p:cNvSpPr>
           <p:nvPr>
-            <p:ph idx="1" type="body"/>
+            <p:ph type="body" idx="1"/>
           </p:nvPr>
         </p:nvSpPr>
         <p:spPr>
@@ -561,7 +688,7 @@
           </a:prstGeom>
         </p:spPr>
         <p:txBody>
-          <a:bodyPr anchorCtr="0" anchor="t" bIns="91425" lIns="91425" rIns="91425" wrap="square" tIns="91425">
+          <a:bodyPr wrap="square" lIns="91425" tIns="91425" rIns="91425" bIns="91425" anchor="t" anchorCtr="0">
             <a:noAutofit/>
           </a:bodyPr>
           <a:lstStyle/>
@@ -572,9 +699,6 @@
               </a:spcBef>
               <a:buNone/>
             </a:pPr>
-            <a:r>
-              <a:t/>
-            </a:r>
             <a:endParaRPr/>
           </a:p>
         </p:txBody>
@@ -588,11 +712,11 @@
 </file>
 
 <file path=ppt/notesSlides/notesSlide3.xml><?xml version="1.0" encoding="utf-8"?>
-<p:notes xmlns:a="http://schemas.openxmlformats.org/drawingml/2006/main" xmlns:r="http://schemas.openxmlformats.org/officeDocument/2006/relationships" xmlns:mc="http://schemas.openxmlformats.org/markup-compatibility/2006" xmlns:mv="urn:schemas-microsoft-com:mac:vml" xmlns:p="http://schemas.openxmlformats.org/presentationml/2006/main" xmlns:c="http://schemas.openxmlformats.org/drawingml/2006/chart" xmlns:dgm="http://schemas.openxmlformats.org/drawingml/2006/diagram" xmlns:o="urn:schemas-microsoft-com:office:office" xmlns:v="urn:schemas-microsoft-com:vml" xmlns:pvml="urn:schemas-microsoft-com:office:powerpoint" xmlns:com="http://schemas.openxmlformats.org/drawingml/2006/compatibility" xmlns:p14="http://schemas.microsoft.com/office/powerpoint/2010/main" xmlns:p15="http://schemas.microsoft.com/office/powerpoint/2012/main" showMasterPhAnim="0" showMasterSp="0">
+<p:notes xmlns:a="http://schemas.openxmlformats.org/drawingml/2006/main" xmlns:r="http://schemas.openxmlformats.org/officeDocument/2006/relationships" xmlns:p="http://schemas.openxmlformats.org/presentationml/2006/main" showMasterSp="0" showMasterPhAnim="0">
   <p:cSld>
     <p:spTree>
       <p:nvGrpSpPr>
-        <p:cNvPr id="66" name="Shape 66"/>
+        <p:cNvPr id="1" name="Shape 66"/>
         <p:cNvGrpSpPr/>
         <p:nvPr/>
       </p:nvGrpSpPr>
@@ -607,19 +731,26 @@
       <p:sp>
         <p:nvSpPr>
           <p:cNvPr id="67" name="Shape 67"/>
-          <p:cNvSpPr/>
+          <p:cNvSpPr>
+            <a:spLocks noGrp="1" noRot="1" noChangeAspect="1"/>
+          </p:cNvSpPr>
           <p:nvPr>
-            <p:ph idx="2" type="sldImg"/>
+            <p:ph type="sldImg" idx="2"/>
           </p:nvPr>
         </p:nvSpPr>
         <p:spPr>
           <a:xfrm>
-            <a:off x="381300" y="685800"/>
+            <a:off x="381000" y="685800"/>
             <a:ext cx="6096000" cy="3429000"/>
           </a:xfrm>
           <a:custGeom>
+            <a:avLst/>
+            <a:gdLst/>
+            <a:ahLst/>
+            <a:cxnLst/>
+            <a:rect l="0" t="0" r="0" b="0"/>
             <a:pathLst>
-              <a:path extrusionOk="0" h="120000" w="120000">
+              <a:path w="120000" h="120000" extrusionOk="0">
                 <a:moveTo>
                   <a:pt x="0" y="0"/>
                 </a:moveTo>
@@ -641,9 +772,11 @@
       <p:sp>
         <p:nvSpPr>
           <p:cNvPr id="68" name="Shape 68"/>
-          <p:cNvSpPr txBox="1"/>
+          <p:cNvSpPr txBox="1">
+            <a:spLocks noGrp="1"/>
+          </p:cNvSpPr>
           <p:nvPr>
-            <p:ph idx="1" type="body"/>
+            <p:ph type="body" idx="1"/>
           </p:nvPr>
         </p:nvSpPr>
         <p:spPr>
@@ -656,7 +789,7 @@
           </a:prstGeom>
         </p:spPr>
         <p:txBody>
-          <a:bodyPr anchorCtr="0" anchor="t" bIns="91425" lIns="91425" rIns="91425" wrap="square" tIns="91425">
+          <a:bodyPr wrap="square" lIns="91425" tIns="91425" rIns="91425" bIns="91425" anchor="t" anchorCtr="0">
             <a:noAutofit/>
           </a:bodyPr>
           <a:lstStyle/>
@@ -667,9 +800,6 @@
               </a:spcBef>
               <a:buNone/>
             </a:pPr>
-            <a:r>
-              <a:t/>
-            </a:r>
             <a:endParaRPr/>
           </a:p>
         </p:txBody>
@@ -683,11 +813,11 @@
 </file>
 
 <file path=ppt/notesSlides/notesSlide4.xml><?xml version="1.0" encoding="utf-8"?>
-<p:notes xmlns:a="http://schemas.openxmlformats.org/drawingml/2006/main" xmlns:r="http://schemas.openxmlformats.org/officeDocument/2006/relationships" xmlns:mc="http://schemas.openxmlformats.org/markup-compatibility/2006" xmlns:mv="urn:schemas-microsoft-com:mac:vml" xmlns:p="http://schemas.openxmlformats.org/presentationml/2006/main" xmlns:c="http://schemas.openxmlformats.org/drawingml/2006/chart" xmlns:dgm="http://schemas.openxmlformats.org/drawingml/2006/diagram" xmlns:o="urn:schemas-microsoft-com:office:office" xmlns:v="urn:schemas-microsoft-com:vml" xmlns:pvml="urn:schemas-microsoft-com:office:powerpoint" xmlns:com="http://schemas.openxmlformats.org/drawingml/2006/compatibility" xmlns:p14="http://schemas.microsoft.com/office/powerpoint/2010/main" xmlns:p15="http://schemas.microsoft.com/office/powerpoint/2012/main" showMasterPhAnim="0" showMasterSp="0">
+<p:notes xmlns:a="http://schemas.openxmlformats.org/drawingml/2006/main" xmlns:r="http://schemas.openxmlformats.org/officeDocument/2006/relationships" xmlns:p="http://schemas.openxmlformats.org/presentationml/2006/main" showMasterSp="0" showMasterPhAnim="0">
   <p:cSld>
     <p:spTree>
       <p:nvGrpSpPr>
-        <p:cNvPr id="73" name="Shape 73"/>
+        <p:cNvPr id="1" name="Shape 73"/>
         <p:cNvGrpSpPr/>
         <p:nvPr/>
       </p:nvGrpSpPr>
@@ -702,19 +832,26 @@
       <p:sp>
         <p:nvSpPr>
           <p:cNvPr id="74" name="Shape 74"/>
-          <p:cNvSpPr/>
+          <p:cNvSpPr>
+            <a:spLocks noGrp="1" noRot="1" noChangeAspect="1"/>
+          </p:cNvSpPr>
           <p:nvPr>
-            <p:ph idx="2" type="sldImg"/>
+            <p:ph type="sldImg" idx="2"/>
           </p:nvPr>
         </p:nvSpPr>
         <p:spPr>
           <a:xfrm>
-            <a:off x="381300" y="685800"/>
+            <a:off x="381000" y="685800"/>
             <a:ext cx="6096000" cy="3429000"/>
           </a:xfrm>
           <a:custGeom>
+            <a:avLst/>
+            <a:gdLst/>
+            <a:ahLst/>
+            <a:cxnLst/>
+            <a:rect l="0" t="0" r="0" b="0"/>
             <a:pathLst>
-              <a:path extrusionOk="0" h="120000" w="120000">
+              <a:path w="120000" h="120000" extrusionOk="0">
                 <a:moveTo>
                   <a:pt x="0" y="0"/>
                 </a:moveTo>
@@ -736,9 +873,11 @@
       <p:sp>
         <p:nvSpPr>
           <p:cNvPr id="75" name="Shape 75"/>
-          <p:cNvSpPr txBox="1"/>
+          <p:cNvSpPr txBox="1">
+            <a:spLocks noGrp="1"/>
+          </p:cNvSpPr>
           <p:nvPr>
-            <p:ph idx="1" type="body"/>
+            <p:ph type="body" idx="1"/>
           </p:nvPr>
         </p:nvSpPr>
         <p:spPr>
@@ -751,7 +890,7 @@
           </a:prstGeom>
         </p:spPr>
         <p:txBody>
-          <a:bodyPr anchorCtr="0" anchor="t" bIns="91425" lIns="91425" rIns="91425" wrap="square" tIns="91425">
+          <a:bodyPr wrap="square" lIns="91425" tIns="91425" rIns="91425" bIns="91425" anchor="t" anchorCtr="0">
             <a:noAutofit/>
           </a:bodyPr>
           <a:lstStyle/>
@@ -762,9 +901,6 @@
               </a:spcBef>
               <a:buNone/>
             </a:pPr>
-            <a:r>
-              <a:t/>
-            </a:r>
             <a:endParaRPr/>
           </a:p>
         </p:txBody>
@@ -778,11 +914,11 @@
 </file>
 
 <file path=ppt/notesSlides/notesSlide5.xml><?xml version="1.0" encoding="utf-8"?>
-<p:notes xmlns:a="http://schemas.openxmlformats.org/drawingml/2006/main" xmlns:r="http://schemas.openxmlformats.org/officeDocument/2006/relationships" xmlns:mc="http://schemas.openxmlformats.org/markup-compatibility/2006" xmlns:mv="urn:schemas-microsoft-com:mac:vml" xmlns:p="http://schemas.openxmlformats.org/presentationml/2006/main" xmlns:c="http://schemas.openxmlformats.org/drawingml/2006/chart" xmlns:dgm="http://schemas.openxmlformats.org/drawingml/2006/diagram" xmlns:o="urn:schemas-microsoft-com:office:office" xmlns:v="urn:schemas-microsoft-com:vml" xmlns:pvml="urn:schemas-microsoft-com:office:powerpoint" xmlns:com="http://schemas.openxmlformats.org/drawingml/2006/compatibility" xmlns:p14="http://schemas.microsoft.com/office/powerpoint/2010/main" xmlns:p15="http://schemas.microsoft.com/office/powerpoint/2012/main" showMasterPhAnim="0" showMasterSp="0">
+<p:notes xmlns:a="http://schemas.openxmlformats.org/drawingml/2006/main" xmlns:r="http://schemas.openxmlformats.org/officeDocument/2006/relationships" xmlns:p="http://schemas.openxmlformats.org/presentationml/2006/main" showMasterSp="0" showMasterPhAnim="0">
   <p:cSld>
     <p:spTree>
       <p:nvGrpSpPr>
-        <p:cNvPr id="80" name="Shape 80"/>
+        <p:cNvPr id="1" name="Shape 80"/>
         <p:cNvGrpSpPr/>
         <p:nvPr/>
       </p:nvGrpSpPr>
@@ -797,19 +933,26 @@
       <p:sp>
         <p:nvSpPr>
           <p:cNvPr id="81" name="Shape 81"/>
-          <p:cNvSpPr/>
+          <p:cNvSpPr>
+            <a:spLocks noGrp="1" noRot="1" noChangeAspect="1"/>
+          </p:cNvSpPr>
           <p:nvPr>
-            <p:ph idx="2" type="sldImg"/>
+            <p:ph type="sldImg" idx="2"/>
           </p:nvPr>
         </p:nvSpPr>
         <p:spPr>
           <a:xfrm>
-            <a:off x="381300" y="685800"/>
+            <a:off x="381000" y="685800"/>
             <a:ext cx="6096000" cy="3429000"/>
           </a:xfrm>
           <a:custGeom>
+            <a:avLst/>
+            <a:gdLst/>
+            <a:ahLst/>
+            <a:cxnLst/>
+            <a:rect l="0" t="0" r="0" b="0"/>
             <a:pathLst>
-              <a:path extrusionOk="0" h="120000" w="120000">
+              <a:path w="120000" h="120000" extrusionOk="0">
                 <a:moveTo>
                   <a:pt x="0" y="0"/>
                 </a:moveTo>
@@ -831,9 +974,11 @@
       <p:sp>
         <p:nvSpPr>
           <p:cNvPr id="82" name="Shape 82"/>
-          <p:cNvSpPr txBox="1"/>
+          <p:cNvSpPr txBox="1">
+            <a:spLocks noGrp="1"/>
+          </p:cNvSpPr>
           <p:nvPr>
-            <p:ph idx="1" type="body"/>
+            <p:ph type="body" idx="1"/>
           </p:nvPr>
         </p:nvSpPr>
         <p:spPr>
@@ -846,7 +991,7 @@
           </a:prstGeom>
         </p:spPr>
         <p:txBody>
-          <a:bodyPr anchorCtr="0" anchor="t" bIns="91425" lIns="91425" rIns="91425" wrap="square" tIns="91425">
+          <a:bodyPr wrap="square" lIns="91425" tIns="91425" rIns="91425" bIns="91425" anchor="t" anchorCtr="0">
             <a:noAutofit/>
           </a:bodyPr>
           <a:lstStyle/>
@@ -857,9 +1002,6 @@
               </a:spcBef>
               <a:buNone/>
             </a:pPr>
-            <a:r>
-              <a:t/>
-            </a:r>
             <a:endParaRPr/>
           </a:p>
         </p:txBody>
@@ -873,11 +1015,11 @@
 </file>
 
 <file path=ppt/notesSlides/notesSlide6.xml><?xml version="1.0" encoding="utf-8"?>
-<p:notes xmlns:a="http://schemas.openxmlformats.org/drawingml/2006/main" xmlns:r="http://schemas.openxmlformats.org/officeDocument/2006/relationships" xmlns:mc="http://schemas.openxmlformats.org/markup-compatibility/2006" xmlns:mv="urn:schemas-microsoft-com:mac:vml" xmlns:p="http://schemas.openxmlformats.org/presentationml/2006/main" xmlns:c="http://schemas.openxmlformats.org/drawingml/2006/chart" xmlns:dgm="http://schemas.openxmlformats.org/drawingml/2006/diagram" xmlns:o="urn:schemas-microsoft-com:office:office" xmlns:v="urn:schemas-microsoft-com:vml" xmlns:pvml="urn:schemas-microsoft-com:office:powerpoint" xmlns:com="http://schemas.openxmlformats.org/drawingml/2006/compatibility" xmlns:p14="http://schemas.microsoft.com/office/powerpoint/2010/main" xmlns:p15="http://schemas.microsoft.com/office/powerpoint/2012/main" showMasterPhAnim="0" showMasterSp="0">
+<p:notes xmlns:a="http://schemas.openxmlformats.org/drawingml/2006/main" xmlns:r="http://schemas.openxmlformats.org/officeDocument/2006/relationships" xmlns:p="http://schemas.openxmlformats.org/presentationml/2006/main" showMasterSp="0" showMasterPhAnim="0">
   <p:cSld>
     <p:spTree>
       <p:nvGrpSpPr>
-        <p:cNvPr id="87" name="Shape 87"/>
+        <p:cNvPr id="1" name="Shape 87"/>
         <p:cNvGrpSpPr/>
         <p:nvPr/>
       </p:nvGrpSpPr>
@@ -892,19 +1034,26 @@
       <p:sp>
         <p:nvSpPr>
           <p:cNvPr id="88" name="Shape 88"/>
-          <p:cNvSpPr/>
+          <p:cNvSpPr>
+            <a:spLocks noGrp="1" noRot="1" noChangeAspect="1"/>
+          </p:cNvSpPr>
           <p:nvPr>
-            <p:ph idx="2" type="sldImg"/>
+            <p:ph type="sldImg" idx="2"/>
           </p:nvPr>
         </p:nvSpPr>
         <p:spPr>
           <a:xfrm>
-            <a:off x="381300" y="685800"/>
+            <a:off x="381000" y="685800"/>
             <a:ext cx="6096000" cy="3429000"/>
           </a:xfrm>
           <a:custGeom>
+            <a:avLst/>
+            <a:gdLst/>
+            <a:ahLst/>
+            <a:cxnLst/>
+            <a:rect l="0" t="0" r="0" b="0"/>
             <a:pathLst>
-              <a:path extrusionOk="0" h="120000" w="120000">
+              <a:path w="120000" h="120000" extrusionOk="0">
                 <a:moveTo>
                   <a:pt x="0" y="0"/>
                 </a:moveTo>
@@ -926,9 +1075,11 @@
       <p:sp>
         <p:nvSpPr>
           <p:cNvPr id="89" name="Shape 89"/>
-          <p:cNvSpPr txBox="1"/>
+          <p:cNvSpPr txBox="1">
+            <a:spLocks noGrp="1"/>
+          </p:cNvSpPr>
           <p:nvPr>
-            <p:ph idx="1" type="body"/>
+            <p:ph type="body" idx="1"/>
           </p:nvPr>
         </p:nvSpPr>
         <p:spPr>
@@ -941,7 +1092,7 @@
           </a:prstGeom>
         </p:spPr>
         <p:txBody>
-          <a:bodyPr anchorCtr="0" anchor="t" bIns="91425" lIns="91425" rIns="91425" wrap="square" tIns="91425">
+          <a:bodyPr wrap="square" lIns="91425" tIns="91425" rIns="91425" bIns="91425" anchor="t" anchorCtr="0">
             <a:noAutofit/>
           </a:bodyPr>
           <a:lstStyle/>
@@ -952,9 +1103,6 @@
               </a:spcBef>
               <a:buNone/>
             </a:pPr>
-            <a:r>
-              <a:t/>
-            </a:r>
             <a:endParaRPr/>
           </a:p>
         </p:txBody>
@@ -968,18 +1116,19 @@
 </file>
 
 <file path=ppt/slideLayouts/slideLayout1.xml><?xml version="1.0" encoding="utf-8"?>
-<p:sldLayout xmlns:a="http://schemas.openxmlformats.org/drawingml/2006/main" xmlns:r="http://schemas.openxmlformats.org/officeDocument/2006/relationships" xmlns:mc="http://schemas.openxmlformats.org/markup-compatibility/2006" xmlns:mv="urn:schemas-microsoft-com:mac:vml" xmlns:p="http://schemas.openxmlformats.org/presentationml/2006/main" xmlns:c="http://schemas.openxmlformats.org/drawingml/2006/chart" xmlns:dgm="http://schemas.openxmlformats.org/drawingml/2006/diagram" xmlns:o="urn:schemas-microsoft-com:office:office" xmlns:v="urn:schemas-microsoft-com:vml" xmlns:pvml="urn:schemas-microsoft-com:office:powerpoint" xmlns:com="http://schemas.openxmlformats.org/drawingml/2006/compatibility" xmlns:p14="http://schemas.microsoft.com/office/powerpoint/2010/main" xmlns:p15="http://schemas.microsoft.com/office/powerpoint/2012/main" type="title">
+<p:sldLayout xmlns:a="http://schemas.openxmlformats.org/drawingml/2006/main" xmlns:r="http://schemas.openxmlformats.org/officeDocument/2006/relationships" xmlns:p="http://schemas.openxmlformats.org/presentationml/2006/main" type="title">
   <p:cSld name="Title slide">
     <p:bg>
       <p:bgPr>
         <a:solidFill>
           <a:schemeClr val="dk1"/>
         </a:solidFill>
+        <a:effectLst/>
       </p:bgPr>
     </p:bg>
     <p:spTree>
       <p:nvGrpSpPr>
-        <p:cNvPr id="9" name="Shape 9"/>
+        <p:cNvPr id="1" name="Shape 9"/>
         <p:cNvGrpSpPr/>
         <p:nvPr/>
       </p:nvGrpSpPr>
@@ -1013,7 +1162,7 @@
           </a:ln>
         </p:spPr>
         <p:txBody>
-          <a:bodyPr anchorCtr="0" anchor="ctr" bIns="91425" lIns="91425" rIns="91425" wrap="square" tIns="91425">
+          <a:bodyPr wrap="square" lIns="91425" tIns="91425" rIns="91425" bIns="91425" anchor="ctr" anchorCtr="0">
             <a:noAutofit/>
           </a:bodyPr>
           <a:lstStyle/>
@@ -1024,9 +1173,6 @@
               </a:spcBef>
               <a:buNone/>
             </a:pPr>
-            <a:r>
-              <a:t/>
-            </a:r>
             <a:endParaRPr/>
           </a:p>
         </p:txBody>
@@ -1046,21 +1192,23 @@
             <a:avLst/>
           </a:prstGeom>
           <a:noFill/>
-          <a:ln cap="flat" cmpd="sng" w="28575">
+          <a:ln w="28575" cap="flat" cmpd="sng">
             <a:solidFill>
               <a:schemeClr val="accent1"/>
             </a:solidFill>
             <a:prstDash val="solid"/>
             <a:round/>
-            <a:headEnd len="med" w="med" type="none"/>
-            <a:tailEnd len="med" w="med" type="none"/>
+            <a:headEnd type="none" w="med" len="med"/>
+            <a:tailEnd type="none" w="med" len="med"/>
           </a:ln>
         </p:spPr>
       </p:cxnSp>
       <p:sp>
         <p:nvSpPr>
           <p:cNvPr id="12" name="Shape 12"/>
-          <p:cNvSpPr txBox="1"/>
+          <p:cNvSpPr txBox="1">
+            <a:spLocks noGrp="1"/>
+          </p:cNvSpPr>
           <p:nvPr>
             <p:ph type="ctrTitle"/>
           </p:nvPr>
@@ -1075,7 +1223,7 @@
           </a:prstGeom>
         </p:spPr>
         <p:txBody>
-          <a:bodyPr anchorCtr="0" anchor="b" bIns="91425" lIns="91425" rIns="91425" wrap="square" tIns="91425"/>
+          <a:bodyPr wrap="square" lIns="91425" tIns="91425" rIns="91425" bIns="91425" anchor="b" anchorCtr="0"/>
           <a:lstStyle>
             <a:lvl1pPr lvl="0">
               <a:spcBef>
@@ -1204,15 +1352,19 @@
               </a:defRPr>
             </a:lvl9pPr>
           </a:lstStyle>
-          <a:p/>
+          <a:p>
+            <a:endParaRPr/>
+          </a:p>
         </p:txBody>
       </p:sp>
       <p:sp>
         <p:nvSpPr>
           <p:cNvPr id="13" name="Shape 13"/>
-          <p:cNvSpPr txBox="1"/>
+          <p:cNvSpPr txBox="1">
+            <a:spLocks noGrp="1"/>
+          </p:cNvSpPr>
           <p:nvPr>
-            <p:ph idx="1" type="subTitle"/>
+            <p:ph type="subTitle" idx="1"/>
           </p:nvPr>
         </p:nvSpPr>
         <p:spPr>
@@ -1225,7 +1377,7 @@
           </a:prstGeom>
         </p:spPr>
         <p:txBody>
-          <a:bodyPr anchorCtr="0" anchor="t" bIns="91425" lIns="91425" rIns="91425" wrap="square" tIns="91425"/>
+          <a:bodyPr wrap="square" lIns="91425" tIns="91425" rIns="91425" bIns="91425" anchor="t" anchorCtr="0"/>
           <a:lstStyle>
             <a:lvl1pPr lvl="0">
               <a:lnSpc>
@@ -1417,15 +1569,19 @@
               </a:defRPr>
             </a:lvl9pPr>
           </a:lstStyle>
-          <a:p/>
+          <a:p>
+            <a:endParaRPr/>
+          </a:p>
         </p:txBody>
       </p:sp>
       <p:sp>
         <p:nvSpPr>
           <p:cNvPr id="14" name="Shape 14"/>
-          <p:cNvSpPr txBox="1"/>
+          <p:cNvSpPr txBox="1">
+            <a:spLocks noGrp="1"/>
+          </p:cNvSpPr>
           <p:nvPr>
-            <p:ph idx="12" type="sldNum"/>
+            <p:ph type="sldNum" idx="12"/>
           </p:nvPr>
         </p:nvSpPr>
         <p:spPr>
@@ -1438,7 +1594,7 @@
           </a:prstGeom>
         </p:spPr>
         <p:txBody>
-          <a:bodyPr anchorCtr="0" anchor="ctr" bIns="91425" lIns="91425" rIns="91425" wrap="square" tIns="91425">
+          <a:bodyPr wrap="square" lIns="91425" tIns="91425" rIns="91425" bIns="91425" anchor="ctr" anchorCtr="0">
             <a:noAutofit/>
           </a:bodyPr>
           <a:lstStyle/>
@@ -1457,6 +1613,11 @@
               </a:rPr>
               <a:t>‹#›</a:t>
             </a:fld>
+            <a:endParaRPr lang="en">
+              <a:solidFill>
+                <a:schemeClr val="accent1"/>
+              </a:solidFill>
+            </a:endParaRPr>
           </a:p>
         </p:txBody>
       </p:sp>
@@ -1469,11 +1630,11 @@
 </file>
 
 <file path=ppt/slideLayouts/slideLayout10.xml><?xml version="1.0" encoding="utf-8"?>
-<p:sldLayout xmlns:a="http://schemas.openxmlformats.org/drawingml/2006/main" xmlns:r="http://schemas.openxmlformats.org/officeDocument/2006/relationships" xmlns:mc="http://schemas.openxmlformats.org/markup-compatibility/2006" xmlns:mv="urn:schemas-microsoft-com:mac:vml" xmlns:p="http://schemas.openxmlformats.org/presentationml/2006/main" xmlns:c="http://schemas.openxmlformats.org/drawingml/2006/chart" xmlns:dgm="http://schemas.openxmlformats.org/drawingml/2006/diagram" xmlns:o="urn:schemas-microsoft-com:office:office" xmlns:v="urn:schemas-microsoft-com:vml" xmlns:pvml="urn:schemas-microsoft-com:office:powerpoint" xmlns:com="http://schemas.openxmlformats.org/drawingml/2006/compatibility" xmlns:p14="http://schemas.microsoft.com/office/powerpoint/2010/main" xmlns:p15="http://schemas.microsoft.com/office/powerpoint/2012/main">
+<p:sldLayout xmlns:a="http://schemas.openxmlformats.org/drawingml/2006/main" xmlns:r="http://schemas.openxmlformats.org/officeDocument/2006/relationships" xmlns:p="http://schemas.openxmlformats.org/presentationml/2006/main">
   <p:cSld name="Big number">
     <p:spTree>
       <p:nvGrpSpPr>
-        <p:cNvPr id="49" name="Shape 49"/>
+        <p:cNvPr id="1" name="Shape 49"/>
         <p:cNvGrpSpPr/>
         <p:nvPr/>
       </p:nvGrpSpPr>
@@ -1488,7 +1649,9 @@
       <p:sp>
         <p:nvSpPr>
           <p:cNvPr id="50" name="Shape 50"/>
-          <p:cNvSpPr txBox="1"/>
+          <p:cNvSpPr txBox="1">
+            <a:spLocks noGrp="1"/>
+          </p:cNvSpPr>
           <p:nvPr>
             <p:ph type="title"/>
           </p:nvPr>
@@ -1503,81 +1666,85 @@
           </a:prstGeom>
         </p:spPr>
         <p:txBody>
-          <a:bodyPr anchorCtr="0" anchor="b" bIns="91425" lIns="91425" rIns="91425" wrap="square" tIns="91425"/>
+          <a:bodyPr wrap="square" lIns="91425" tIns="91425" rIns="91425" bIns="91425" anchor="b" anchorCtr="0"/>
           <a:lstStyle>
             <a:lvl1pPr lvl="0" algn="ctr">
               <a:spcBef>
                 <a:spcPts val="0"/>
               </a:spcBef>
               <a:buSzPct val="100000"/>
-              <a:defRPr b="1" sz="14000"/>
+              <a:defRPr sz="14000" b="1"/>
             </a:lvl1pPr>
             <a:lvl2pPr lvl="1" algn="ctr">
               <a:spcBef>
                 <a:spcPts val="0"/>
               </a:spcBef>
               <a:buSzPct val="100000"/>
-              <a:defRPr b="1" sz="14000"/>
+              <a:defRPr sz="14000" b="1"/>
             </a:lvl2pPr>
             <a:lvl3pPr lvl="2" algn="ctr">
               <a:spcBef>
                 <a:spcPts val="0"/>
               </a:spcBef>
               <a:buSzPct val="100000"/>
-              <a:defRPr b="1" sz="14000"/>
+              <a:defRPr sz="14000" b="1"/>
             </a:lvl3pPr>
             <a:lvl4pPr lvl="3" algn="ctr">
               <a:spcBef>
                 <a:spcPts val="0"/>
               </a:spcBef>
               <a:buSzPct val="100000"/>
-              <a:defRPr b="1" sz="14000"/>
+              <a:defRPr sz="14000" b="1"/>
             </a:lvl4pPr>
             <a:lvl5pPr lvl="4" algn="ctr">
               <a:spcBef>
                 <a:spcPts val="0"/>
               </a:spcBef>
               <a:buSzPct val="100000"/>
-              <a:defRPr b="1" sz="14000"/>
+              <a:defRPr sz="14000" b="1"/>
             </a:lvl5pPr>
             <a:lvl6pPr lvl="5" algn="ctr">
               <a:spcBef>
                 <a:spcPts val="0"/>
               </a:spcBef>
               <a:buSzPct val="100000"/>
-              <a:defRPr b="1" sz="14000"/>
+              <a:defRPr sz="14000" b="1"/>
             </a:lvl6pPr>
             <a:lvl7pPr lvl="6" algn="ctr">
               <a:spcBef>
                 <a:spcPts val="0"/>
               </a:spcBef>
               <a:buSzPct val="100000"/>
-              <a:defRPr b="1" sz="14000"/>
+              <a:defRPr sz="14000" b="1"/>
             </a:lvl7pPr>
             <a:lvl8pPr lvl="7" algn="ctr">
               <a:spcBef>
                 <a:spcPts val="0"/>
               </a:spcBef>
               <a:buSzPct val="100000"/>
-              <a:defRPr b="1" sz="14000"/>
+              <a:defRPr sz="14000" b="1"/>
             </a:lvl8pPr>
             <a:lvl9pPr lvl="8" algn="ctr">
               <a:spcBef>
                 <a:spcPts val="0"/>
               </a:spcBef>
               <a:buSzPct val="100000"/>
-              <a:defRPr b="1" sz="14000"/>
+              <a:defRPr sz="14000" b="1"/>
             </a:lvl9pPr>
           </a:lstStyle>
-          <a:p/>
+          <a:p>
+            <a:endParaRPr/>
+          </a:p>
         </p:txBody>
       </p:sp>
       <p:sp>
         <p:nvSpPr>
           <p:cNvPr id="51" name="Shape 51"/>
-          <p:cNvSpPr txBox="1"/>
+          <p:cNvSpPr txBox="1">
+            <a:spLocks noGrp="1"/>
+          </p:cNvSpPr>
           <p:nvPr>
-            <p:ph idx="1" type="body"/>
+            <p:ph type="body" idx="1"/>
           </p:nvPr>
         </p:nvSpPr>
         <p:spPr>
@@ -1590,7 +1757,7 @@
           </a:prstGeom>
         </p:spPr>
         <p:txBody>
-          <a:bodyPr anchorCtr="0" anchor="t" bIns="91425" lIns="91425" rIns="91425" wrap="square" tIns="91425"/>
+          <a:bodyPr wrap="square" lIns="91425" tIns="91425" rIns="91425" bIns="91425" anchor="t" anchorCtr="0"/>
           <a:lstStyle>
             <a:lvl1pPr lvl="0" algn="ctr">
               <a:spcBef>
@@ -1647,15 +1814,19 @@
               <a:defRPr/>
             </a:lvl9pPr>
           </a:lstStyle>
-          <a:p/>
+          <a:p>
+            <a:endParaRPr/>
+          </a:p>
         </p:txBody>
       </p:sp>
       <p:sp>
         <p:nvSpPr>
           <p:cNvPr id="52" name="Shape 52"/>
-          <p:cNvSpPr txBox="1"/>
+          <p:cNvSpPr txBox="1">
+            <a:spLocks noGrp="1"/>
+          </p:cNvSpPr>
           <p:nvPr>
-            <p:ph idx="12" type="sldNum"/>
+            <p:ph type="sldNum" idx="12"/>
           </p:nvPr>
         </p:nvSpPr>
         <p:spPr>
@@ -1668,7 +1839,7 @@
           </a:prstGeom>
         </p:spPr>
         <p:txBody>
-          <a:bodyPr anchorCtr="0" anchor="ctr" bIns="91425" lIns="91425" rIns="91425" wrap="square" tIns="91425">
+          <a:bodyPr wrap="square" lIns="91425" tIns="91425" rIns="91425" bIns="91425" anchor="ctr" anchorCtr="0">
             <a:noAutofit/>
           </a:bodyPr>
           <a:lstStyle/>
@@ -1683,6 +1854,7 @@
               <a:rPr lang="en"/>
               <a:t>‹#›</a:t>
             </a:fld>
+            <a:endParaRPr lang="en"/>
           </a:p>
         </p:txBody>
       </p:sp>
@@ -1695,11 +1867,11 @@
 </file>
 
 <file path=ppt/slideLayouts/slideLayout11.xml><?xml version="1.0" encoding="utf-8"?>
-<p:sldLayout xmlns:a="http://schemas.openxmlformats.org/drawingml/2006/main" xmlns:r="http://schemas.openxmlformats.org/officeDocument/2006/relationships" xmlns:mc="http://schemas.openxmlformats.org/markup-compatibility/2006" xmlns:mv="urn:schemas-microsoft-com:mac:vml" xmlns:p="http://schemas.openxmlformats.org/presentationml/2006/main" xmlns:c="http://schemas.openxmlformats.org/drawingml/2006/chart" xmlns:dgm="http://schemas.openxmlformats.org/drawingml/2006/diagram" xmlns:o="urn:schemas-microsoft-com:office:office" xmlns:v="urn:schemas-microsoft-com:vml" xmlns:pvml="urn:schemas-microsoft-com:office:powerpoint" xmlns:com="http://schemas.openxmlformats.org/drawingml/2006/compatibility" xmlns:p14="http://schemas.microsoft.com/office/powerpoint/2010/main" xmlns:p15="http://schemas.microsoft.com/office/powerpoint/2012/main" type="blank">
+<p:sldLayout xmlns:a="http://schemas.openxmlformats.org/drawingml/2006/main" xmlns:r="http://schemas.openxmlformats.org/officeDocument/2006/relationships" xmlns:p="http://schemas.openxmlformats.org/presentationml/2006/main" type="blank">
   <p:cSld name="Blank">
     <p:spTree>
       <p:nvGrpSpPr>
-        <p:cNvPr id="53" name="Shape 53"/>
+        <p:cNvPr id="1" name="Shape 53"/>
         <p:cNvGrpSpPr/>
         <p:nvPr/>
       </p:nvGrpSpPr>
@@ -1714,9 +1886,11 @@
       <p:sp>
         <p:nvSpPr>
           <p:cNvPr id="54" name="Shape 54"/>
-          <p:cNvSpPr txBox="1"/>
+          <p:cNvSpPr txBox="1">
+            <a:spLocks noGrp="1"/>
+          </p:cNvSpPr>
           <p:nvPr>
-            <p:ph idx="12" type="sldNum"/>
+            <p:ph type="sldNum" idx="12"/>
           </p:nvPr>
         </p:nvSpPr>
         <p:spPr>
@@ -1729,7 +1903,7 @@
           </a:prstGeom>
         </p:spPr>
         <p:txBody>
-          <a:bodyPr anchorCtr="0" anchor="ctr" bIns="91425" lIns="91425" rIns="91425" wrap="square" tIns="91425">
+          <a:bodyPr wrap="square" lIns="91425" tIns="91425" rIns="91425" bIns="91425" anchor="ctr" anchorCtr="0">
             <a:noAutofit/>
           </a:bodyPr>
           <a:lstStyle/>
@@ -1744,6 +1918,7 @@
               <a:rPr lang="en"/>
               <a:t>‹#›</a:t>
             </a:fld>
+            <a:endParaRPr lang="en"/>
           </a:p>
         </p:txBody>
       </p:sp>
@@ -1756,18 +1931,19 @@
 </file>
 
 <file path=ppt/slideLayouts/slideLayout2.xml><?xml version="1.0" encoding="utf-8"?>
-<p:sldLayout xmlns:a="http://schemas.openxmlformats.org/drawingml/2006/main" xmlns:r="http://schemas.openxmlformats.org/officeDocument/2006/relationships" xmlns:mc="http://schemas.openxmlformats.org/markup-compatibility/2006" xmlns:mv="urn:schemas-microsoft-com:mac:vml" xmlns:p="http://schemas.openxmlformats.org/presentationml/2006/main" xmlns:c="http://schemas.openxmlformats.org/drawingml/2006/chart" xmlns:dgm="http://schemas.openxmlformats.org/drawingml/2006/diagram" xmlns:o="urn:schemas-microsoft-com:office:office" xmlns:v="urn:schemas-microsoft-com:vml" xmlns:pvml="urn:schemas-microsoft-com:office:powerpoint" xmlns:com="http://schemas.openxmlformats.org/drawingml/2006/compatibility" xmlns:p14="http://schemas.microsoft.com/office/powerpoint/2010/main" xmlns:p15="http://schemas.microsoft.com/office/powerpoint/2012/main" type="secHead">
+<p:sldLayout xmlns:a="http://schemas.openxmlformats.org/drawingml/2006/main" xmlns:r="http://schemas.openxmlformats.org/officeDocument/2006/relationships" xmlns:p="http://schemas.openxmlformats.org/presentationml/2006/main" type="secHead">
   <p:cSld name="Section header">
     <p:bg>
       <p:bgPr>
         <a:solidFill>
           <a:schemeClr val="dk1"/>
         </a:solidFill>
+        <a:effectLst/>
       </p:bgPr>
     </p:bg>
     <p:spTree>
       <p:nvGrpSpPr>
-        <p:cNvPr id="15" name="Shape 15"/>
+        <p:cNvPr id="1" name="Shape 15"/>
         <p:cNvGrpSpPr/>
         <p:nvPr/>
       </p:nvGrpSpPr>
@@ -1794,21 +1970,23 @@
             <a:avLst/>
           </a:prstGeom>
           <a:noFill/>
-          <a:ln cap="flat" cmpd="sng" w="28575">
+          <a:ln w="28575" cap="flat" cmpd="sng">
             <a:solidFill>
               <a:schemeClr val="lt2"/>
             </a:solidFill>
             <a:prstDash val="solid"/>
             <a:round/>
-            <a:headEnd len="med" w="med" type="none"/>
-            <a:tailEnd len="med" w="med" type="none"/>
+            <a:headEnd type="none" w="med" len="med"/>
+            <a:tailEnd type="none" w="med" len="med"/>
           </a:ln>
         </p:spPr>
       </p:cxnSp>
       <p:sp>
         <p:nvSpPr>
           <p:cNvPr id="17" name="Shape 17"/>
-          <p:cNvSpPr txBox="1"/>
+          <p:cNvSpPr txBox="1">
+            <a:spLocks noGrp="1"/>
+          </p:cNvSpPr>
           <p:nvPr>
             <p:ph type="title"/>
           </p:nvPr>
@@ -1823,7 +2001,7 @@
           </a:prstGeom>
         </p:spPr>
         <p:txBody>
-          <a:bodyPr anchorCtr="0" anchor="b" bIns="91425" lIns="91425" rIns="91425" wrap="square" tIns="91425"/>
+          <a:bodyPr wrap="square" lIns="91425" tIns="91425" rIns="91425" bIns="91425" anchor="b" anchorCtr="0"/>
           <a:lstStyle>
             <a:lvl1pPr lvl="0">
               <a:spcBef>
@@ -1952,15 +2130,19 @@
               </a:defRPr>
             </a:lvl9pPr>
           </a:lstStyle>
-          <a:p/>
+          <a:p>
+            <a:endParaRPr/>
+          </a:p>
         </p:txBody>
       </p:sp>
       <p:sp>
         <p:nvSpPr>
           <p:cNvPr id="18" name="Shape 18"/>
-          <p:cNvSpPr txBox="1"/>
+          <p:cNvSpPr txBox="1">
+            <a:spLocks noGrp="1"/>
+          </p:cNvSpPr>
           <p:nvPr>
-            <p:ph idx="12" type="sldNum"/>
+            <p:ph type="sldNum" idx="12"/>
           </p:nvPr>
         </p:nvSpPr>
         <p:spPr>
@@ -1973,7 +2155,7 @@
           </a:prstGeom>
         </p:spPr>
         <p:txBody>
-          <a:bodyPr anchorCtr="0" anchor="ctr" bIns="91425" lIns="91425" rIns="91425" wrap="square" tIns="91425">
+          <a:bodyPr wrap="square" lIns="91425" tIns="91425" rIns="91425" bIns="91425" anchor="ctr" anchorCtr="0">
             <a:noAutofit/>
           </a:bodyPr>
           <a:lstStyle/>
@@ -1992,6 +2174,11 @@
               </a:rPr>
               <a:t>‹#›</a:t>
             </a:fld>
+            <a:endParaRPr lang="en">
+              <a:solidFill>
+                <a:schemeClr val="accent1"/>
+              </a:solidFill>
+            </a:endParaRPr>
           </a:p>
         </p:txBody>
       </p:sp>
@@ -2004,11 +2191,11 @@
 </file>
 
 <file path=ppt/slideLayouts/slideLayout3.xml><?xml version="1.0" encoding="utf-8"?>
-<p:sldLayout xmlns:a="http://schemas.openxmlformats.org/drawingml/2006/main" xmlns:r="http://schemas.openxmlformats.org/officeDocument/2006/relationships" xmlns:mc="http://schemas.openxmlformats.org/markup-compatibility/2006" xmlns:mv="urn:schemas-microsoft-com:mac:vml" xmlns:p="http://schemas.openxmlformats.org/presentationml/2006/main" xmlns:c="http://schemas.openxmlformats.org/drawingml/2006/chart" xmlns:dgm="http://schemas.openxmlformats.org/drawingml/2006/diagram" xmlns:o="urn:schemas-microsoft-com:office:office" xmlns:v="urn:schemas-microsoft-com:vml" xmlns:pvml="urn:schemas-microsoft-com:office:powerpoint" xmlns:com="http://schemas.openxmlformats.org/drawingml/2006/compatibility" xmlns:p14="http://schemas.microsoft.com/office/powerpoint/2010/main" xmlns:p15="http://schemas.microsoft.com/office/powerpoint/2012/main" type="tx">
+<p:sldLayout xmlns:a="http://schemas.openxmlformats.org/drawingml/2006/main" xmlns:r="http://schemas.openxmlformats.org/officeDocument/2006/relationships" xmlns:p="http://schemas.openxmlformats.org/presentationml/2006/main" type="tx">
   <p:cSld name="Title and body">
     <p:spTree>
       <p:nvGrpSpPr>
-        <p:cNvPr id="19" name="Shape 19"/>
+        <p:cNvPr id="1" name="Shape 19"/>
         <p:cNvGrpSpPr/>
         <p:nvPr/>
       </p:nvGrpSpPr>
@@ -2042,7 +2229,7 @@
           </a:ln>
         </p:spPr>
         <p:txBody>
-          <a:bodyPr anchorCtr="0" anchor="ctr" bIns="91425" lIns="91425" rIns="91425" wrap="square" tIns="91425">
+          <a:bodyPr wrap="square" lIns="91425" tIns="91425" rIns="91425" bIns="91425" anchor="ctr" anchorCtr="0">
             <a:noAutofit/>
           </a:bodyPr>
           <a:lstStyle/>
@@ -2053,9 +2240,6 @@
               </a:spcBef>
               <a:buNone/>
             </a:pPr>
-            <a:r>
-              <a:t/>
-            </a:r>
             <a:endParaRPr/>
           </a:p>
         </p:txBody>
@@ -2063,7 +2247,9 @@
       <p:sp>
         <p:nvSpPr>
           <p:cNvPr id="21" name="Shape 21"/>
-          <p:cNvSpPr txBox="1"/>
+          <p:cNvSpPr txBox="1">
+            <a:spLocks noGrp="1"/>
+          </p:cNvSpPr>
           <p:nvPr>
             <p:ph type="title"/>
           </p:nvPr>
@@ -2078,7 +2264,7 @@
           </a:prstGeom>
         </p:spPr>
         <p:txBody>
-          <a:bodyPr anchorCtr="0" anchor="t" bIns="91425" lIns="91425" rIns="91425" wrap="square" tIns="91425"/>
+          <a:bodyPr wrap="square" lIns="91425" tIns="91425" rIns="91425" bIns="91425" anchor="t" anchorCtr="0"/>
           <a:lstStyle>
             <a:lvl1pPr lvl="0">
               <a:spcBef>
@@ -2135,15 +2321,19 @@
               <a:defRPr/>
             </a:lvl9pPr>
           </a:lstStyle>
-          <a:p/>
+          <a:p>
+            <a:endParaRPr/>
+          </a:p>
         </p:txBody>
       </p:sp>
       <p:sp>
         <p:nvSpPr>
           <p:cNvPr id="22" name="Shape 22"/>
-          <p:cNvSpPr txBox="1"/>
+          <p:cNvSpPr txBox="1">
+            <a:spLocks noGrp="1"/>
+          </p:cNvSpPr>
           <p:nvPr>
-            <p:ph idx="1" type="body"/>
+            <p:ph type="body" idx="1"/>
           </p:nvPr>
         </p:nvSpPr>
         <p:spPr>
@@ -2156,7 +2346,7 @@
           </a:prstGeom>
         </p:spPr>
         <p:txBody>
-          <a:bodyPr anchorCtr="0" anchor="t" bIns="91425" lIns="91425" rIns="91425" wrap="square" tIns="91425"/>
+          <a:bodyPr wrap="square" lIns="91425" tIns="91425" rIns="91425" bIns="91425" anchor="t" anchorCtr="0"/>
           <a:lstStyle>
             <a:lvl1pPr lvl="0">
               <a:spcBef>
@@ -2213,15 +2403,19 @@
               <a:defRPr/>
             </a:lvl9pPr>
           </a:lstStyle>
-          <a:p/>
+          <a:p>
+            <a:endParaRPr/>
+          </a:p>
         </p:txBody>
       </p:sp>
       <p:sp>
         <p:nvSpPr>
           <p:cNvPr id="23" name="Shape 23"/>
-          <p:cNvSpPr txBox="1"/>
+          <p:cNvSpPr txBox="1">
+            <a:spLocks noGrp="1"/>
+          </p:cNvSpPr>
           <p:nvPr>
-            <p:ph idx="12" type="sldNum"/>
+            <p:ph type="sldNum" idx="12"/>
           </p:nvPr>
         </p:nvSpPr>
         <p:spPr>
@@ -2234,7 +2428,7 @@
           </a:prstGeom>
         </p:spPr>
         <p:txBody>
-          <a:bodyPr anchorCtr="0" anchor="ctr" bIns="91425" lIns="91425" rIns="91425" wrap="square" tIns="91425">
+          <a:bodyPr wrap="square" lIns="91425" tIns="91425" rIns="91425" bIns="91425" anchor="ctr" anchorCtr="0">
             <a:noAutofit/>
           </a:bodyPr>
           <a:lstStyle/>
@@ -2249,6 +2443,7 @@
               <a:rPr lang="en"/>
               <a:t>‹#›</a:t>
             </a:fld>
+            <a:endParaRPr lang="en"/>
           </a:p>
         </p:txBody>
       </p:sp>
@@ -2261,11 +2456,11 @@
 </file>
 
 <file path=ppt/slideLayouts/slideLayout4.xml><?xml version="1.0" encoding="utf-8"?>
-<p:sldLayout xmlns:a="http://schemas.openxmlformats.org/drawingml/2006/main" xmlns:r="http://schemas.openxmlformats.org/officeDocument/2006/relationships" xmlns:mc="http://schemas.openxmlformats.org/markup-compatibility/2006" xmlns:mv="urn:schemas-microsoft-com:mac:vml" xmlns:p="http://schemas.openxmlformats.org/presentationml/2006/main" xmlns:c="http://schemas.openxmlformats.org/drawingml/2006/chart" xmlns:dgm="http://schemas.openxmlformats.org/drawingml/2006/diagram" xmlns:o="urn:schemas-microsoft-com:office:office" xmlns:v="urn:schemas-microsoft-com:vml" xmlns:pvml="urn:schemas-microsoft-com:office:powerpoint" xmlns:com="http://schemas.openxmlformats.org/drawingml/2006/compatibility" xmlns:p14="http://schemas.microsoft.com/office/powerpoint/2010/main" xmlns:p15="http://schemas.microsoft.com/office/powerpoint/2012/main" type="twoColTx">
+<p:sldLayout xmlns:a="http://schemas.openxmlformats.org/drawingml/2006/main" xmlns:r="http://schemas.openxmlformats.org/officeDocument/2006/relationships" xmlns:p="http://schemas.openxmlformats.org/presentationml/2006/main" type="twoColTx">
   <p:cSld name="Title and two columns">
     <p:spTree>
       <p:nvGrpSpPr>
-        <p:cNvPr id="24" name="Shape 24"/>
+        <p:cNvPr id="1" name="Shape 24"/>
         <p:cNvGrpSpPr/>
         <p:nvPr/>
       </p:nvGrpSpPr>
@@ -2280,7 +2475,9 @@
       <p:sp>
         <p:nvSpPr>
           <p:cNvPr id="25" name="Shape 25"/>
-          <p:cNvSpPr txBox="1"/>
+          <p:cNvSpPr txBox="1">
+            <a:spLocks noGrp="1"/>
+          </p:cNvSpPr>
           <p:nvPr>
             <p:ph type="title"/>
           </p:nvPr>
@@ -2295,7 +2492,7 @@
           </a:prstGeom>
         </p:spPr>
         <p:txBody>
-          <a:bodyPr anchorCtr="0" anchor="t" bIns="91425" lIns="91425" rIns="91425" wrap="square" tIns="91425"/>
+          <a:bodyPr wrap="square" lIns="91425" tIns="91425" rIns="91425" bIns="91425" anchor="t" anchorCtr="0"/>
           <a:lstStyle>
             <a:lvl1pPr lvl="0">
               <a:spcBef>
@@ -2352,15 +2549,19 @@
               <a:defRPr/>
             </a:lvl9pPr>
           </a:lstStyle>
-          <a:p/>
+          <a:p>
+            <a:endParaRPr/>
+          </a:p>
         </p:txBody>
       </p:sp>
       <p:sp>
         <p:nvSpPr>
           <p:cNvPr id="26" name="Shape 26"/>
-          <p:cNvSpPr txBox="1"/>
+          <p:cNvSpPr txBox="1">
+            <a:spLocks noGrp="1"/>
+          </p:cNvSpPr>
           <p:nvPr>
-            <p:ph idx="1" type="body"/>
+            <p:ph type="body" idx="1"/>
           </p:nvPr>
         </p:nvSpPr>
         <p:spPr>
@@ -2373,7 +2574,7 @@
           </a:prstGeom>
         </p:spPr>
         <p:txBody>
-          <a:bodyPr anchorCtr="0" anchor="t" bIns="91425" lIns="91425" rIns="91425" wrap="square" tIns="91425"/>
+          <a:bodyPr wrap="square" lIns="91425" tIns="91425" rIns="91425" bIns="91425" anchor="t" anchorCtr="0"/>
           <a:lstStyle>
             <a:lvl1pPr lvl="0">
               <a:spcBef>
@@ -2439,15 +2640,19 @@
               <a:defRPr sz="1200"/>
             </a:lvl9pPr>
           </a:lstStyle>
-          <a:p/>
+          <a:p>
+            <a:endParaRPr/>
+          </a:p>
         </p:txBody>
       </p:sp>
       <p:sp>
         <p:nvSpPr>
           <p:cNvPr id="27" name="Shape 27"/>
-          <p:cNvSpPr txBox="1"/>
+          <p:cNvSpPr txBox="1">
+            <a:spLocks noGrp="1"/>
+          </p:cNvSpPr>
           <p:nvPr>
-            <p:ph idx="2" type="body"/>
+            <p:ph type="body" idx="2"/>
           </p:nvPr>
         </p:nvSpPr>
         <p:spPr>
@@ -2460,7 +2665,7 @@
           </a:prstGeom>
         </p:spPr>
         <p:txBody>
-          <a:bodyPr anchorCtr="0" anchor="t" bIns="91425" lIns="91425" rIns="91425" wrap="square" tIns="91425"/>
+          <a:bodyPr wrap="square" lIns="91425" tIns="91425" rIns="91425" bIns="91425" anchor="t" anchorCtr="0"/>
           <a:lstStyle>
             <a:lvl1pPr lvl="0">
               <a:spcBef>
@@ -2526,15 +2731,19 @@
               <a:defRPr sz="1200"/>
             </a:lvl9pPr>
           </a:lstStyle>
-          <a:p/>
+          <a:p>
+            <a:endParaRPr/>
+          </a:p>
         </p:txBody>
       </p:sp>
       <p:sp>
         <p:nvSpPr>
           <p:cNvPr id="28" name="Shape 28"/>
-          <p:cNvSpPr txBox="1"/>
+          <p:cNvSpPr txBox="1">
+            <a:spLocks noGrp="1"/>
+          </p:cNvSpPr>
           <p:nvPr>
-            <p:ph idx="12" type="sldNum"/>
+            <p:ph type="sldNum" idx="12"/>
           </p:nvPr>
         </p:nvSpPr>
         <p:spPr>
@@ -2547,7 +2756,7 @@
           </a:prstGeom>
         </p:spPr>
         <p:txBody>
-          <a:bodyPr anchorCtr="0" anchor="ctr" bIns="91425" lIns="91425" rIns="91425" wrap="square" tIns="91425">
+          <a:bodyPr wrap="square" lIns="91425" tIns="91425" rIns="91425" bIns="91425" anchor="ctr" anchorCtr="0">
             <a:noAutofit/>
           </a:bodyPr>
           <a:lstStyle/>
@@ -2562,6 +2771,7 @@
               <a:rPr lang="en"/>
               <a:t>‹#›</a:t>
             </a:fld>
+            <a:endParaRPr lang="en"/>
           </a:p>
         </p:txBody>
       </p:sp>
@@ -2574,11 +2784,11 @@
 </file>
 
 <file path=ppt/slideLayouts/slideLayout5.xml><?xml version="1.0" encoding="utf-8"?>
-<p:sldLayout xmlns:a="http://schemas.openxmlformats.org/drawingml/2006/main" xmlns:r="http://schemas.openxmlformats.org/officeDocument/2006/relationships" xmlns:mc="http://schemas.openxmlformats.org/markup-compatibility/2006" xmlns:mv="urn:schemas-microsoft-com:mac:vml" xmlns:p="http://schemas.openxmlformats.org/presentationml/2006/main" xmlns:c="http://schemas.openxmlformats.org/drawingml/2006/chart" xmlns:dgm="http://schemas.openxmlformats.org/drawingml/2006/diagram" xmlns:o="urn:schemas-microsoft-com:office:office" xmlns:v="urn:schemas-microsoft-com:vml" xmlns:pvml="urn:schemas-microsoft-com:office:powerpoint" xmlns:com="http://schemas.openxmlformats.org/drawingml/2006/compatibility" xmlns:p14="http://schemas.microsoft.com/office/powerpoint/2010/main" xmlns:p15="http://schemas.microsoft.com/office/powerpoint/2012/main" type="titleOnly">
+<p:sldLayout xmlns:a="http://schemas.openxmlformats.org/drawingml/2006/main" xmlns:r="http://schemas.openxmlformats.org/officeDocument/2006/relationships" xmlns:p="http://schemas.openxmlformats.org/presentationml/2006/main" type="titleOnly">
   <p:cSld name="Title only">
     <p:spTree>
       <p:nvGrpSpPr>
-        <p:cNvPr id="29" name="Shape 29"/>
+        <p:cNvPr id="1" name="Shape 29"/>
         <p:cNvGrpSpPr/>
         <p:nvPr/>
       </p:nvGrpSpPr>
@@ -2593,7 +2803,9 @@
       <p:sp>
         <p:nvSpPr>
           <p:cNvPr id="30" name="Shape 30"/>
-          <p:cNvSpPr txBox="1"/>
+          <p:cNvSpPr txBox="1">
+            <a:spLocks noGrp="1"/>
+          </p:cNvSpPr>
           <p:nvPr>
             <p:ph type="title"/>
           </p:nvPr>
@@ -2608,7 +2820,7 @@
           </a:prstGeom>
         </p:spPr>
         <p:txBody>
-          <a:bodyPr anchorCtr="0" anchor="t" bIns="91425" lIns="91425" rIns="91425" wrap="square" tIns="91425"/>
+          <a:bodyPr wrap="square" lIns="91425" tIns="91425" rIns="91425" bIns="91425" anchor="t" anchorCtr="0"/>
           <a:lstStyle>
             <a:lvl1pPr lvl="0">
               <a:spcBef>
@@ -2665,15 +2877,19 @@
               <a:defRPr/>
             </a:lvl9pPr>
           </a:lstStyle>
-          <a:p/>
+          <a:p>
+            <a:endParaRPr/>
+          </a:p>
         </p:txBody>
       </p:sp>
       <p:sp>
         <p:nvSpPr>
           <p:cNvPr id="31" name="Shape 31"/>
-          <p:cNvSpPr txBox="1"/>
+          <p:cNvSpPr txBox="1">
+            <a:spLocks noGrp="1"/>
+          </p:cNvSpPr>
           <p:nvPr>
-            <p:ph idx="12" type="sldNum"/>
+            <p:ph type="sldNum" idx="12"/>
           </p:nvPr>
         </p:nvSpPr>
         <p:spPr>
@@ -2686,7 +2902,7 @@
           </a:prstGeom>
         </p:spPr>
         <p:txBody>
-          <a:bodyPr anchorCtr="0" anchor="ctr" bIns="91425" lIns="91425" rIns="91425" wrap="square" tIns="91425">
+          <a:bodyPr wrap="square" lIns="91425" tIns="91425" rIns="91425" bIns="91425" anchor="ctr" anchorCtr="0">
             <a:noAutofit/>
           </a:bodyPr>
           <a:lstStyle/>
@@ -2701,6 +2917,7 @@
               <a:rPr lang="en"/>
               <a:t>‹#›</a:t>
             </a:fld>
+            <a:endParaRPr lang="en"/>
           </a:p>
         </p:txBody>
       </p:sp>
@@ -2713,11 +2930,11 @@
 </file>
 
 <file path=ppt/slideLayouts/slideLayout6.xml><?xml version="1.0" encoding="utf-8"?>
-<p:sldLayout xmlns:a="http://schemas.openxmlformats.org/drawingml/2006/main" xmlns:r="http://schemas.openxmlformats.org/officeDocument/2006/relationships" xmlns:mc="http://schemas.openxmlformats.org/markup-compatibility/2006" xmlns:mv="urn:schemas-microsoft-com:mac:vml" xmlns:p="http://schemas.openxmlformats.org/presentationml/2006/main" xmlns:c="http://schemas.openxmlformats.org/drawingml/2006/chart" xmlns:dgm="http://schemas.openxmlformats.org/drawingml/2006/diagram" xmlns:o="urn:schemas-microsoft-com:office:office" xmlns:v="urn:schemas-microsoft-com:vml" xmlns:pvml="urn:schemas-microsoft-com:office:powerpoint" xmlns:com="http://schemas.openxmlformats.org/drawingml/2006/compatibility" xmlns:p14="http://schemas.microsoft.com/office/powerpoint/2010/main" xmlns:p15="http://schemas.microsoft.com/office/powerpoint/2012/main">
+<p:sldLayout xmlns:a="http://schemas.openxmlformats.org/drawingml/2006/main" xmlns:r="http://schemas.openxmlformats.org/officeDocument/2006/relationships" xmlns:p="http://schemas.openxmlformats.org/presentationml/2006/main">
   <p:cSld name="One column text">
     <p:spTree>
       <p:nvGrpSpPr>
-        <p:cNvPr id="32" name="Shape 32"/>
+        <p:cNvPr id="1" name="Shape 32"/>
         <p:cNvGrpSpPr/>
         <p:nvPr/>
       </p:nvGrpSpPr>
@@ -2732,7 +2949,9 @@
       <p:sp>
         <p:nvSpPr>
           <p:cNvPr id="33" name="Shape 33"/>
-          <p:cNvSpPr txBox="1"/>
+          <p:cNvSpPr txBox="1">
+            <a:spLocks noGrp="1"/>
+          </p:cNvSpPr>
           <p:nvPr>
             <p:ph type="title"/>
           </p:nvPr>
@@ -2747,7 +2966,7 @@
           </a:prstGeom>
         </p:spPr>
         <p:txBody>
-          <a:bodyPr anchorCtr="0" anchor="b" bIns="91425" lIns="91425" rIns="91425" wrap="square" tIns="91425"/>
+          <a:bodyPr wrap="square" lIns="91425" tIns="91425" rIns="91425" bIns="91425" anchor="b" anchorCtr="0"/>
           <a:lstStyle>
             <a:lvl1pPr lvl="0">
               <a:spcBef>
@@ -2813,15 +3032,19 @@
               <a:defRPr sz="2400"/>
             </a:lvl9pPr>
           </a:lstStyle>
-          <a:p/>
+          <a:p>
+            <a:endParaRPr/>
+          </a:p>
         </p:txBody>
       </p:sp>
       <p:sp>
         <p:nvSpPr>
           <p:cNvPr id="34" name="Shape 34"/>
-          <p:cNvSpPr txBox="1"/>
+          <p:cNvSpPr txBox="1">
+            <a:spLocks noGrp="1"/>
+          </p:cNvSpPr>
           <p:nvPr>
-            <p:ph idx="1" type="body"/>
+            <p:ph type="body" idx="1"/>
           </p:nvPr>
         </p:nvSpPr>
         <p:spPr>
@@ -2834,7 +3057,7 @@
           </a:prstGeom>
         </p:spPr>
         <p:txBody>
-          <a:bodyPr anchorCtr="0" anchor="t" bIns="91425" lIns="91425" rIns="91425" wrap="square" tIns="91425"/>
+          <a:bodyPr wrap="square" lIns="91425" tIns="91425" rIns="91425" bIns="91425" anchor="t" anchorCtr="0"/>
           <a:lstStyle>
             <a:lvl1pPr lvl="0">
               <a:spcBef>
@@ -2900,15 +3123,19 @@
               <a:defRPr sz="1200"/>
             </a:lvl9pPr>
           </a:lstStyle>
-          <a:p/>
+          <a:p>
+            <a:endParaRPr/>
+          </a:p>
         </p:txBody>
       </p:sp>
       <p:sp>
         <p:nvSpPr>
           <p:cNvPr id="35" name="Shape 35"/>
-          <p:cNvSpPr txBox="1"/>
+          <p:cNvSpPr txBox="1">
+            <a:spLocks noGrp="1"/>
+          </p:cNvSpPr>
           <p:nvPr>
-            <p:ph idx="12" type="sldNum"/>
+            <p:ph type="sldNum" idx="12"/>
           </p:nvPr>
         </p:nvSpPr>
         <p:spPr>
@@ -2921,7 +3148,7 @@
           </a:prstGeom>
         </p:spPr>
         <p:txBody>
-          <a:bodyPr anchorCtr="0" anchor="ctr" bIns="91425" lIns="91425" rIns="91425" wrap="square" tIns="91425">
+          <a:bodyPr wrap="square" lIns="91425" tIns="91425" rIns="91425" bIns="91425" anchor="ctr" anchorCtr="0">
             <a:noAutofit/>
           </a:bodyPr>
           <a:lstStyle/>
@@ -2936,6 +3163,7 @@
               <a:rPr lang="en"/>
               <a:t>‹#›</a:t>
             </a:fld>
+            <a:endParaRPr lang="en"/>
           </a:p>
         </p:txBody>
       </p:sp>
@@ -2948,18 +3176,19 @@
 </file>
 
 <file path=ppt/slideLayouts/slideLayout7.xml><?xml version="1.0" encoding="utf-8"?>
-<p:sldLayout xmlns:a="http://schemas.openxmlformats.org/drawingml/2006/main" xmlns:r="http://schemas.openxmlformats.org/officeDocument/2006/relationships" xmlns:mc="http://schemas.openxmlformats.org/markup-compatibility/2006" xmlns:mv="urn:schemas-microsoft-com:mac:vml" xmlns:p="http://schemas.openxmlformats.org/presentationml/2006/main" xmlns:c="http://schemas.openxmlformats.org/drawingml/2006/chart" xmlns:dgm="http://schemas.openxmlformats.org/drawingml/2006/diagram" xmlns:o="urn:schemas-microsoft-com:office:office" xmlns:v="urn:schemas-microsoft-com:vml" xmlns:pvml="urn:schemas-microsoft-com:office:powerpoint" xmlns:com="http://schemas.openxmlformats.org/drawingml/2006/compatibility" xmlns:p14="http://schemas.microsoft.com/office/powerpoint/2010/main" xmlns:p15="http://schemas.microsoft.com/office/powerpoint/2012/main">
+<p:sldLayout xmlns:a="http://schemas.openxmlformats.org/drawingml/2006/main" xmlns:r="http://schemas.openxmlformats.org/officeDocument/2006/relationships" xmlns:p="http://schemas.openxmlformats.org/presentationml/2006/main">
   <p:cSld name="Main point">
     <p:bg>
       <p:bgPr>
         <a:solidFill>
           <a:schemeClr val="lt2"/>
         </a:solidFill>
+        <a:effectLst/>
       </p:bgPr>
     </p:bg>
     <p:spTree>
       <p:nvGrpSpPr>
-        <p:cNvPr id="36" name="Shape 36"/>
+        <p:cNvPr id="1" name="Shape 36"/>
         <p:cNvGrpSpPr/>
         <p:nvPr/>
       </p:nvGrpSpPr>
@@ -2974,7 +3203,9 @@
       <p:sp>
         <p:nvSpPr>
           <p:cNvPr id="37" name="Shape 37"/>
-          <p:cNvSpPr txBox="1"/>
+          <p:cNvSpPr txBox="1">
+            <a:spLocks noGrp="1"/>
+          </p:cNvSpPr>
           <p:nvPr>
             <p:ph type="title"/>
           </p:nvPr>
@@ -2989,7 +3220,7 @@
           </a:prstGeom>
         </p:spPr>
         <p:txBody>
-          <a:bodyPr anchorCtr="0" anchor="ctr" bIns="91425" lIns="91425" rIns="91425" wrap="square" tIns="91425"/>
+          <a:bodyPr wrap="square" lIns="91425" tIns="91425" rIns="91425" bIns="91425" anchor="ctr" anchorCtr="0"/>
           <a:lstStyle>
             <a:lvl1pPr lvl="0">
               <a:spcBef>
@@ -3118,15 +3349,19 @@
               </a:defRPr>
             </a:lvl9pPr>
           </a:lstStyle>
-          <a:p/>
+          <a:p>
+            <a:endParaRPr/>
+          </a:p>
         </p:txBody>
       </p:sp>
       <p:sp>
         <p:nvSpPr>
           <p:cNvPr id="38" name="Shape 38"/>
-          <p:cNvSpPr txBox="1"/>
+          <p:cNvSpPr txBox="1">
+            <a:spLocks noGrp="1"/>
+          </p:cNvSpPr>
           <p:nvPr>
-            <p:ph idx="12" type="sldNum"/>
+            <p:ph type="sldNum" idx="12"/>
           </p:nvPr>
         </p:nvSpPr>
         <p:spPr>
@@ -3139,7 +3374,7 @@
           </a:prstGeom>
         </p:spPr>
         <p:txBody>
-          <a:bodyPr anchorCtr="0" anchor="ctr" bIns="91425" lIns="91425" rIns="91425" wrap="square" tIns="91425">
+          <a:bodyPr wrap="square" lIns="91425" tIns="91425" rIns="91425" bIns="91425" anchor="ctr" anchorCtr="0">
             <a:noAutofit/>
           </a:bodyPr>
           <a:lstStyle/>
@@ -3158,6 +3393,11 @@
               </a:rPr>
               <a:t>‹#›</a:t>
             </a:fld>
+            <a:endParaRPr lang="en">
+              <a:solidFill>
+                <a:schemeClr val="accent1"/>
+              </a:solidFill>
+            </a:endParaRPr>
           </a:p>
         </p:txBody>
       </p:sp>
@@ -3170,11 +3410,11 @@
 </file>
 
 <file path=ppt/slideLayouts/slideLayout8.xml><?xml version="1.0" encoding="utf-8"?>
-<p:sldLayout xmlns:a="http://schemas.openxmlformats.org/drawingml/2006/main" xmlns:r="http://schemas.openxmlformats.org/officeDocument/2006/relationships" xmlns:mc="http://schemas.openxmlformats.org/markup-compatibility/2006" xmlns:mv="urn:schemas-microsoft-com:mac:vml" xmlns:p="http://schemas.openxmlformats.org/presentationml/2006/main" xmlns:c="http://schemas.openxmlformats.org/drawingml/2006/chart" xmlns:dgm="http://schemas.openxmlformats.org/drawingml/2006/diagram" xmlns:o="urn:schemas-microsoft-com:office:office" xmlns:v="urn:schemas-microsoft-com:vml" xmlns:pvml="urn:schemas-microsoft-com:office:powerpoint" xmlns:com="http://schemas.openxmlformats.org/drawingml/2006/compatibility" xmlns:p14="http://schemas.microsoft.com/office/powerpoint/2010/main" xmlns:p15="http://schemas.microsoft.com/office/powerpoint/2012/main">
+<p:sldLayout xmlns:a="http://schemas.openxmlformats.org/drawingml/2006/main" xmlns:r="http://schemas.openxmlformats.org/officeDocument/2006/relationships" xmlns:p="http://schemas.openxmlformats.org/presentationml/2006/main">
   <p:cSld name="Section title and description">
     <p:spTree>
       <p:nvGrpSpPr>
-        <p:cNvPr id="39" name="Shape 39"/>
+        <p:cNvPr id="1" name="Shape 39"/>
         <p:cNvGrpSpPr/>
         <p:nvPr/>
       </p:nvGrpSpPr>
@@ -3208,7 +3448,7 @@
           </a:ln>
         </p:spPr>
         <p:txBody>
-          <a:bodyPr anchorCtr="0" anchor="ctr" bIns="91425" lIns="91425" rIns="91425" wrap="square" tIns="91425">
+          <a:bodyPr wrap="square" lIns="91425" tIns="91425" rIns="91425" bIns="91425" anchor="ctr" anchorCtr="0">
             <a:noAutofit/>
           </a:bodyPr>
           <a:lstStyle/>
@@ -3219,9 +3459,6 @@
               </a:spcBef>
               <a:buNone/>
             </a:pPr>
-            <a:r>
-              <a:t/>
-            </a:r>
             <a:endParaRPr/>
           </a:p>
         </p:txBody>
@@ -3241,21 +3478,23 @@
             <a:avLst/>
           </a:prstGeom>
           <a:noFill/>
-          <a:ln cap="flat" cmpd="sng" w="19050">
+          <a:ln w="19050" cap="flat" cmpd="sng">
             <a:solidFill>
               <a:schemeClr val="lt2"/>
             </a:solidFill>
             <a:prstDash val="solid"/>
             <a:round/>
-            <a:headEnd len="med" w="med" type="none"/>
-            <a:tailEnd len="med" w="med" type="none"/>
+            <a:headEnd type="none" w="med" len="med"/>
+            <a:tailEnd type="none" w="med" len="med"/>
           </a:ln>
         </p:spPr>
       </p:cxnSp>
       <p:sp>
         <p:nvSpPr>
           <p:cNvPr id="42" name="Shape 42"/>
-          <p:cNvSpPr txBox="1"/>
+          <p:cNvSpPr txBox="1">
+            <a:spLocks noGrp="1"/>
+          </p:cNvSpPr>
           <p:nvPr>
             <p:ph type="title"/>
           </p:nvPr>
@@ -3270,7 +3509,7 @@
           </a:prstGeom>
         </p:spPr>
         <p:txBody>
-          <a:bodyPr anchorCtr="0" anchor="b" bIns="91425" lIns="91425" rIns="91425" wrap="square" tIns="91425"/>
+          <a:bodyPr wrap="square" lIns="91425" tIns="91425" rIns="91425" bIns="91425" anchor="b" anchorCtr="0"/>
           <a:lstStyle>
             <a:lvl1pPr lvl="0" algn="ctr">
               <a:spcBef>
@@ -3399,15 +3638,19 @@
               </a:defRPr>
             </a:lvl9pPr>
           </a:lstStyle>
-          <a:p/>
+          <a:p>
+            <a:endParaRPr/>
+          </a:p>
         </p:txBody>
       </p:sp>
       <p:sp>
         <p:nvSpPr>
           <p:cNvPr id="43" name="Shape 43"/>
-          <p:cNvSpPr txBox="1"/>
+          <p:cNvSpPr txBox="1">
+            <a:spLocks noGrp="1"/>
+          </p:cNvSpPr>
           <p:nvPr>
-            <p:ph idx="1" type="subTitle"/>
+            <p:ph type="subTitle" idx="1"/>
           </p:nvPr>
         </p:nvSpPr>
         <p:spPr>
@@ -3420,7 +3663,7 @@
           </a:prstGeom>
         </p:spPr>
         <p:txBody>
-          <a:bodyPr anchorCtr="0" anchor="t" bIns="91425" lIns="91425" rIns="91425" wrap="square" tIns="91425"/>
+          <a:bodyPr wrap="square" lIns="91425" tIns="91425" rIns="91425" bIns="91425" anchor="t" anchorCtr="0"/>
           <a:lstStyle>
             <a:lvl1pPr lvl="0" algn="ctr">
               <a:lnSpc>
@@ -3549,15 +3792,19 @@
               <a:defRPr sz="2100"/>
             </a:lvl9pPr>
           </a:lstStyle>
-          <a:p/>
+          <a:p>
+            <a:endParaRPr/>
+          </a:p>
         </p:txBody>
       </p:sp>
       <p:sp>
         <p:nvSpPr>
           <p:cNvPr id="44" name="Shape 44"/>
-          <p:cNvSpPr txBox="1"/>
+          <p:cNvSpPr txBox="1">
+            <a:spLocks noGrp="1"/>
+          </p:cNvSpPr>
           <p:nvPr>
-            <p:ph idx="2" type="body"/>
+            <p:ph type="body" idx="2"/>
           </p:nvPr>
         </p:nvSpPr>
         <p:spPr>
@@ -3570,7 +3817,7 @@
           </a:prstGeom>
         </p:spPr>
         <p:txBody>
-          <a:bodyPr anchorCtr="0" anchor="ctr" bIns="91425" lIns="91425" rIns="91425" wrap="square" tIns="91425"/>
+          <a:bodyPr wrap="square" lIns="91425" tIns="91425" rIns="91425" bIns="91425" anchor="ctr" anchorCtr="0"/>
           <a:lstStyle>
             <a:lvl1pPr lvl="0">
               <a:spcBef>
@@ -3690,15 +3937,19 @@
               </a:defRPr>
             </a:lvl9pPr>
           </a:lstStyle>
-          <a:p/>
+          <a:p>
+            <a:endParaRPr/>
+          </a:p>
         </p:txBody>
       </p:sp>
       <p:sp>
         <p:nvSpPr>
           <p:cNvPr id="45" name="Shape 45"/>
-          <p:cNvSpPr txBox="1"/>
+          <p:cNvSpPr txBox="1">
+            <a:spLocks noGrp="1"/>
+          </p:cNvSpPr>
           <p:nvPr>
-            <p:ph idx="12" type="sldNum"/>
+            <p:ph type="sldNum" idx="12"/>
           </p:nvPr>
         </p:nvSpPr>
         <p:spPr>
@@ -3711,7 +3962,7 @@
           </a:prstGeom>
         </p:spPr>
         <p:txBody>
-          <a:bodyPr anchorCtr="0" anchor="ctr" bIns="91425" lIns="91425" rIns="91425" wrap="square" tIns="91425">
+          <a:bodyPr wrap="square" lIns="91425" tIns="91425" rIns="91425" bIns="91425" anchor="ctr" anchorCtr="0">
             <a:noAutofit/>
           </a:bodyPr>
           <a:lstStyle/>
@@ -3730,6 +3981,11 @@
               </a:rPr>
               <a:t>‹#›</a:t>
             </a:fld>
+            <a:endParaRPr lang="en">
+              <a:solidFill>
+                <a:schemeClr val="accent1"/>
+              </a:solidFill>
+            </a:endParaRPr>
           </a:p>
         </p:txBody>
       </p:sp>
@@ -3742,11 +3998,11 @@
 </file>
 
 <file path=ppt/slideLayouts/slideLayout9.xml><?xml version="1.0" encoding="utf-8"?>
-<p:sldLayout xmlns:a="http://schemas.openxmlformats.org/drawingml/2006/main" xmlns:r="http://schemas.openxmlformats.org/officeDocument/2006/relationships" xmlns:mc="http://schemas.openxmlformats.org/markup-compatibility/2006" xmlns:mv="urn:schemas-microsoft-com:mac:vml" xmlns:p="http://schemas.openxmlformats.org/presentationml/2006/main" xmlns:c="http://schemas.openxmlformats.org/drawingml/2006/chart" xmlns:dgm="http://schemas.openxmlformats.org/drawingml/2006/diagram" xmlns:o="urn:schemas-microsoft-com:office:office" xmlns:v="urn:schemas-microsoft-com:vml" xmlns:pvml="urn:schemas-microsoft-com:office:powerpoint" xmlns:com="http://schemas.openxmlformats.org/drawingml/2006/compatibility" xmlns:p14="http://schemas.microsoft.com/office/powerpoint/2010/main" xmlns:p15="http://schemas.microsoft.com/office/powerpoint/2012/main">
+<p:sldLayout xmlns:a="http://schemas.openxmlformats.org/drawingml/2006/main" xmlns:r="http://schemas.openxmlformats.org/officeDocument/2006/relationships" xmlns:p="http://schemas.openxmlformats.org/presentationml/2006/main">
   <p:cSld name="Caption">
     <p:spTree>
       <p:nvGrpSpPr>
-        <p:cNvPr id="46" name="Shape 46"/>
+        <p:cNvPr id="1" name="Shape 46"/>
         <p:cNvGrpSpPr/>
         <p:nvPr/>
       </p:nvGrpSpPr>
@@ -3761,9 +4017,11 @@
       <p:sp>
         <p:nvSpPr>
           <p:cNvPr id="47" name="Shape 47"/>
-          <p:cNvSpPr txBox="1"/>
+          <p:cNvSpPr txBox="1">
+            <a:spLocks noGrp="1"/>
+          </p:cNvSpPr>
           <p:nvPr>
-            <p:ph idx="1" type="body"/>
+            <p:ph type="body" idx="1"/>
           </p:nvPr>
         </p:nvSpPr>
         <p:spPr>
@@ -3776,7 +4034,7 @@
           </a:prstGeom>
         </p:spPr>
         <p:txBody>
-          <a:bodyPr anchorCtr="0" anchor="ctr" bIns="91425" lIns="91425" rIns="91425" wrap="square" tIns="91425"/>
+          <a:bodyPr wrap="square" lIns="91425" tIns="91425" rIns="91425" bIns="91425" anchor="ctr" anchorCtr="0"/>
           <a:lstStyle>
             <a:lvl1pPr lvl="0">
               <a:lnSpc>
@@ -3792,15 +4050,19 @@
               <a:defRPr/>
             </a:lvl1pPr>
           </a:lstStyle>
-          <a:p/>
+          <a:p>
+            <a:endParaRPr/>
+          </a:p>
         </p:txBody>
       </p:sp>
       <p:sp>
         <p:nvSpPr>
           <p:cNvPr id="48" name="Shape 48"/>
-          <p:cNvSpPr txBox="1"/>
+          <p:cNvSpPr txBox="1">
+            <a:spLocks noGrp="1"/>
+          </p:cNvSpPr>
           <p:nvPr>
-            <p:ph idx="12" type="sldNum"/>
+            <p:ph type="sldNum" idx="12"/>
           </p:nvPr>
         </p:nvSpPr>
         <p:spPr>
@@ -3813,7 +4075,7 @@
           </a:prstGeom>
         </p:spPr>
         <p:txBody>
-          <a:bodyPr anchorCtr="0" anchor="ctr" bIns="91425" lIns="91425" rIns="91425" wrap="square" tIns="91425">
+          <a:bodyPr wrap="square" lIns="91425" tIns="91425" rIns="91425" bIns="91425" anchor="ctr" anchorCtr="0">
             <a:noAutofit/>
           </a:bodyPr>
           <a:lstStyle/>
@@ -3828,6 +4090,7 @@
               <a:rPr lang="en"/>
               <a:t>‹#›</a:t>
             </a:fld>
+            <a:endParaRPr lang="en"/>
           </a:p>
         </p:txBody>
       </p:sp>
@@ -3840,18 +4103,19 @@
 </file>
 
 <file path=ppt/slideMasters/slideMaster1.xml><?xml version="1.0" encoding="utf-8"?>
-<p:sldMaster xmlns:a="http://schemas.openxmlformats.org/drawingml/2006/main" xmlns:r="http://schemas.openxmlformats.org/officeDocument/2006/relationships" xmlns:mc="http://schemas.openxmlformats.org/markup-compatibility/2006" xmlns:mv="urn:schemas-microsoft-com:mac:vml" xmlns:p="http://schemas.openxmlformats.org/presentationml/2006/main" xmlns:c="http://schemas.openxmlformats.org/drawingml/2006/chart" xmlns:dgm="http://schemas.openxmlformats.org/drawingml/2006/diagram" xmlns:o="urn:schemas-microsoft-com:office:office" xmlns:v="urn:schemas-microsoft-com:vml" xmlns:pvml="urn:schemas-microsoft-com:office:powerpoint" xmlns:com="http://schemas.openxmlformats.org/drawingml/2006/compatibility" xmlns:p14="http://schemas.microsoft.com/office/powerpoint/2010/main" xmlns:p15="http://schemas.microsoft.com/office/powerpoint/2012/main">
+<p:sldMaster xmlns:a="http://schemas.openxmlformats.org/drawingml/2006/main" xmlns:r="http://schemas.openxmlformats.org/officeDocument/2006/relationships" xmlns:p="http://schemas.openxmlformats.org/presentationml/2006/main">
   <p:cSld name="paperback">
     <p:bg>
       <p:bgPr>
         <a:solidFill>
           <a:schemeClr val="accent1"/>
         </a:solidFill>
+        <a:effectLst/>
       </p:bgPr>
     </p:bg>
     <p:spTree>
       <p:nvGrpSpPr>
-        <p:cNvPr id="5" name="Shape 5"/>
+        <p:cNvPr id="1" name="Shape 5"/>
         <p:cNvGrpSpPr/>
         <p:nvPr/>
       </p:nvGrpSpPr>
@@ -3866,7 +4130,9 @@
       <p:sp>
         <p:nvSpPr>
           <p:cNvPr id="6" name="Shape 6"/>
-          <p:cNvSpPr txBox="1"/>
+          <p:cNvSpPr txBox="1">
+            <a:spLocks noGrp="1"/>
+          </p:cNvSpPr>
           <p:nvPr>
             <p:ph type="title"/>
           </p:nvPr>
@@ -3885,7 +4151,7 @@
           </a:ln>
         </p:spPr>
         <p:txBody>
-          <a:bodyPr anchorCtr="0" anchor="t" bIns="91425" lIns="91425" rIns="91425" wrap="square" tIns="91425"/>
+          <a:bodyPr wrap="square" lIns="91425" tIns="91425" rIns="91425" bIns="91425" anchor="t" anchorCtr="0"/>
           <a:lstStyle>
             <a:lvl1pPr lvl="0">
               <a:spcBef>
@@ -4068,15 +4334,19 @@
               </a:defRPr>
             </a:lvl9pPr>
           </a:lstStyle>
-          <a:p/>
+          <a:p>
+            <a:endParaRPr/>
+          </a:p>
         </p:txBody>
       </p:sp>
       <p:sp>
         <p:nvSpPr>
           <p:cNvPr id="7" name="Shape 7"/>
-          <p:cNvSpPr txBox="1"/>
+          <p:cNvSpPr txBox="1">
+            <a:spLocks noGrp="1"/>
+          </p:cNvSpPr>
           <p:nvPr>
-            <p:ph idx="1" type="body"/>
+            <p:ph type="body" idx="1"/>
           </p:nvPr>
         </p:nvSpPr>
         <p:spPr>
@@ -4093,7 +4363,7 @@
           </a:ln>
         </p:spPr>
         <p:txBody>
-          <a:bodyPr anchorCtr="0" anchor="t" bIns="91425" lIns="91425" rIns="91425" wrap="square" tIns="91425"/>
+          <a:bodyPr wrap="square" lIns="91425" tIns="91425" rIns="91425" bIns="91425" anchor="t" anchorCtr="0"/>
           <a:lstStyle>
             <a:lvl1pPr lvl="0">
               <a:lnSpc>
@@ -4322,15 +4592,19 @@
               </a:defRPr>
             </a:lvl9pPr>
           </a:lstStyle>
-          <a:p/>
+          <a:p>
+            <a:endParaRPr/>
+          </a:p>
         </p:txBody>
       </p:sp>
       <p:sp>
         <p:nvSpPr>
           <p:cNvPr id="8" name="Shape 8"/>
-          <p:cNvSpPr txBox="1"/>
+          <p:cNvSpPr txBox="1">
+            <a:spLocks noGrp="1"/>
+          </p:cNvSpPr>
           <p:nvPr>
-            <p:ph idx="12" type="sldNum"/>
+            <p:ph type="sldNum" idx="12"/>
           </p:nvPr>
         </p:nvSpPr>
         <p:spPr>
@@ -4347,7 +4621,7 @@
           </a:ln>
         </p:spPr>
         <p:txBody>
-          <a:bodyPr anchorCtr="0" anchor="ctr" bIns="91425" lIns="91425" rIns="91425" wrap="square" tIns="91425">
+          <a:bodyPr wrap="square" lIns="91425" tIns="91425" rIns="91425" bIns="91425" anchor="ctr" anchorCtr="0">
             <a:noAutofit/>
           </a:bodyPr>
           <a:lstStyle/>
@@ -4370,12 +4644,21 @@
               </a:rPr>
               <a:t>‹#›</a:t>
             </a:fld>
+            <a:endParaRPr lang="en" sz="1000">
+              <a:solidFill>
+                <a:schemeClr val="dk1"/>
+              </a:solidFill>
+              <a:latin typeface="Old Standard TT"/>
+              <a:ea typeface="Old Standard TT"/>
+              <a:cs typeface="Old Standard TT"/>
+              <a:sym typeface="Old Standard TT"/>
+            </a:endParaRPr>
           </a:p>
         </p:txBody>
       </p:sp>
     </p:spTree>
   </p:cSld>
-  <p:clrMap accent1="accent1" accent2="accent2" accent3="accent3" accent4="accent4" accent5="accent5" accent6="accent6" bg1="lt1" bg2="dk2" tx1="dk1" tx2="lt2" folHlink="folHlink" hlink="hlink"/>
+  <p:clrMap bg1="lt1" tx1="dk1" bg2="dk2" tx2="lt2" accent1="accent1" accent2="accent2" accent3="accent3" accent4="accent4" accent5="accent5" accent6="accent6" hlink="hlink" folHlink="folHlink"/>
   <p:sldLayoutIdLst>
     <p:sldLayoutId id="2147483648" r:id="rId1"/>
     <p:sldLayoutId id="2147483649" r:id="rId2"/>
@@ -4389,10 +4672,10 @@
     <p:sldLayoutId id="2147483657" r:id="rId10"/>
     <p:sldLayoutId id="2147483658" r:id="rId11"/>
   </p:sldLayoutIdLst>
-  <p:hf dt="0" ftr="0" hdr="0" sldNum="0"/>
+  <p:hf sldNum="0" hdr="0" ftr="0" dt="0"/>
   <p:txStyles>
     <p:titleStyle>
-      <a:defPPr lvl="0" marR="0" rtl="0" algn="l">
+      <a:defPPr marR="0" lvl="0" algn="l" rtl="0">
         <a:lnSpc>
           <a:spcPct val="100000"/>
         </a:lnSpc>
@@ -4403,7 +4686,7 @@
           <a:spcPts val="0"/>
         </a:spcAft>
       </a:defPPr>
-      <a:lvl1pPr lvl="0" marR="0" rtl="0" algn="l">
+      <a:lvl1pPr marR="0" lvl="0" algn="l" rtl="0">
         <a:lnSpc>
           <a:spcPct val="100000"/>
         </a:lnSpc>
@@ -4414,7 +4697,7 @@
           <a:spcPts val="0"/>
         </a:spcAft>
         <a:buNone/>
-        <a:defRPr b="0" i="0" sz="1400" u="none" cap="none" strike="noStrike">
+        <a:defRPr sz="1400" b="0" i="0" u="none" strike="noStrike" cap="none">
           <a:solidFill>
             <a:srgbClr val="000000"/>
           </a:solidFill>
@@ -4426,7 +4709,7 @@
       </a:lvl1pPr>
     </p:titleStyle>
     <p:bodyStyle>
-      <a:defPPr lvl="0" marR="0" rtl="0" algn="l">
+      <a:defPPr marR="0" lvl="0" algn="l" rtl="0">
         <a:lnSpc>
           <a:spcPct val="100000"/>
         </a:lnSpc>
@@ -4437,7 +4720,7 @@
           <a:spcPts val="0"/>
         </a:spcAft>
       </a:defPPr>
-      <a:lvl1pPr lvl="0" marR="0" rtl="0" algn="l">
+      <a:lvl1pPr marR="0" lvl="0" algn="l" rtl="0">
         <a:lnSpc>
           <a:spcPct val="100000"/>
         </a:lnSpc>
@@ -4448,7 +4731,7 @@
           <a:spcPts val="0"/>
         </a:spcAft>
         <a:buNone/>
-        <a:defRPr b="0" i="0" sz="1400" u="none" cap="none" strike="noStrike">
+        <a:defRPr sz="1400" b="0" i="0" u="none" strike="noStrike" cap="none">
           <a:solidFill>
             <a:srgbClr val="000000"/>
           </a:solidFill>
@@ -4458,7 +4741,7 @@
           <a:sym typeface="Arial"/>
         </a:defRPr>
       </a:lvl1pPr>
-      <a:lvl2pPr lvl="1" marR="0" rtl="0" algn="l">
+      <a:lvl2pPr marR="0" lvl="1" algn="l" rtl="0">
         <a:lnSpc>
           <a:spcPct val="100000"/>
         </a:lnSpc>
@@ -4469,7 +4752,7 @@
           <a:spcPts val="0"/>
         </a:spcAft>
         <a:buNone/>
-        <a:defRPr b="0" i="0" sz="1400" u="none" cap="none" strike="noStrike">
+        <a:defRPr sz="1400" b="0" i="0" u="none" strike="noStrike" cap="none">
           <a:solidFill>
             <a:srgbClr val="000000"/>
           </a:solidFill>
@@ -4479,7 +4762,7 @@
           <a:sym typeface="Arial"/>
         </a:defRPr>
       </a:lvl2pPr>
-      <a:lvl3pPr lvl="2" marR="0" rtl="0" algn="l">
+      <a:lvl3pPr marR="0" lvl="2" algn="l" rtl="0">
         <a:lnSpc>
           <a:spcPct val="100000"/>
         </a:lnSpc>
@@ -4490,7 +4773,7 @@
           <a:spcPts val="0"/>
         </a:spcAft>
         <a:buNone/>
-        <a:defRPr b="0" i="0" sz="1400" u="none" cap="none" strike="noStrike">
+        <a:defRPr sz="1400" b="0" i="0" u="none" strike="noStrike" cap="none">
           <a:solidFill>
             <a:srgbClr val="000000"/>
           </a:solidFill>
@@ -4500,7 +4783,7 @@
           <a:sym typeface="Arial"/>
         </a:defRPr>
       </a:lvl3pPr>
-      <a:lvl4pPr lvl="3" marR="0" rtl="0" algn="l">
+      <a:lvl4pPr marR="0" lvl="3" algn="l" rtl="0">
         <a:lnSpc>
           <a:spcPct val="100000"/>
         </a:lnSpc>
@@ -4511,7 +4794,7 @@
           <a:spcPts val="0"/>
         </a:spcAft>
         <a:buNone/>
-        <a:defRPr b="0" i="0" sz="1400" u="none" cap="none" strike="noStrike">
+        <a:defRPr sz="1400" b="0" i="0" u="none" strike="noStrike" cap="none">
           <a:solidFill>
             <a:srgbClr val="000000"/>
           </a:solidFill>
@@ -4521,7 +4804,7 @@
           <a:sym typeface="Arial"/>
         </a:defRPr>
       </a:lvl4pPr>
-      <a:lvl5pPr lvl="4" marR="0" rtl="0" algn="l">
+      <a:lvl5pPr marR="0" lvl="4" algn="l" rtl="0">
         <a:lnSpc>
           <a:spcPct val="100000"/>
         </a:lnSpc>
@@ -4532,7 +4815,7 @@
           <a:spcPts val="0"/>
         </a:spcAft>
         <a:buNone/>
-        <a:defRPr b="0" i="0" sz="1400" u="none" cap="none" strike="noStrike">
+        <a:defRPr sz="1400" b="0" i="0" u="none" strike="noStrike" cap="none">
           <a:solidFill>
             <a:srgbClr val="000000"/>
           </a:solidFill>
@@ -4542,7 +4825,7 @@
           <a:sym typeface="Arial"/>
         </a:defRPr>
       </a:lvl5pPr>
-      <a:lvl6pPr lvl="5" marR="0" rtl="0" algn="l">
+      <a:lvl6pPr marR="0" lvl="5" algn="l" rtl="0">
         <a:lnSpc>
           <a:spcPct val="100000"/>
         </a:lnSpc>
@@ -4553,7 +4836,7 @@
           <a:spcPts val="0"/>
         </a:spcAft>
         <a:buNone/>
-        <a:defRPr b="0" i="0" sz="1400" u="none" cap="none" strike="noStrike">
+        <a:defRPr sz="1400" b="0" i="0" u="none" strike="noStrike" cap="none">
           <a:solidFill>
             <a:srgbClr val="000000"/>
           </a:solidFill>
@@ -4563,7 +4846,7 @@
           <a:sym typeface="Arial"/>
         </a:defRPr>
       </a:lvl6pPr>
-      <a:lvl7pPr lvl="6" marR="0" rtl="0" algn="l">
+      <a:lvl7pPr marR="0" lvl="6" algn="l" rtl="0">
         <a:lnSpc>
           <a:spcPct val="100000"/>
         </a:lnSpc>
@@ -4574,7 +4857,7 @@
           <a:spcPts val="0"/>
         </a:spcAft>
         <a:buNone/>
-        <a:defRPr b="0" i="0" sz="1400" u="none" cap="none" strike="noStrike">
+        <a:defRPr sz="1400" b="0" i="0" u="none" strike="noStrike" cap="none">
           <a:solidFill>
             <a:srgbClr val="000000"/>
           </a:solidFill>
@@ -4584,7 +4867,7 @@
           <a:sym typeface="Arial"/>
         </a:defRPr>
       </a:lvl7pPr>
-      <a:lvl8pPr lvl="7" marR="0" rtl="0" algn="l">
+      <a:lvl8pPr marR="0" lvl="7" algn="l" rtl="0">
         <a:lnSpc>
           <a:spcPct val="100000"/>
         </a:lnSpc>
@@ -4595,7 +4878,7 @@
           <a:spcPts val="0"/>
         </a:spcAft>
         <a:buNone/>
-        <a:defRPr b="0" i="0" sz="1400" u="none" cap="none" strike="noStrike">
+        <a:defRPr sz="1400" b="0" i="0" u="none" strike="noStrike" cap="none">
           <a:solidFill>
             <a:srgbClr val="000000"/>
           </a:solidFill>
@@ -4605,7 +4888,7 @@
           <a:sym typeface="Arial"/>
         </a:defRPr>
       </a:lvl8pPr>
-      <a:lvl9pPr lvl="8" marR="0" rtl="0" algn="l">
+      <a:lvl9pPr marR="0" lvl="8" algn="l" rtl="0">
         <a:lnSpc>
           <a:spcPct val="100000"/>
         </a:lnSpc>
@@ -4616,7 +4899,7 @@
           <a:spcPts val="0"/>
         </a:spcAft>
         <a:buNone/>
-        <a:defRPr b="0" i="0" sz="1400" u="none" cap="none" strike="noStrike">
+        <a:defRPr sz="1400" b="0" i="0" u="none" strike="noStrike" cap="none">
           <a:solidFill>
             <a:srgbClr val="000000"/>
           </a:solidFill>
@@ -4628,7 +4911,7 @@
       </a:lvl9pPr>
     </p:bodyStyle>
     <p:otherStyle>
-      <a:defPPr lvl="0" marR="0" rtl="0" algn="l">
+      <a:defPPr marR="0" lvl="0" algn="l" rtl="0">
         <a:lnSpc>
           <a:spcPct val="100000"/>
         </a:lnSpc>
@@ -4639,7 +4922,7 @@
           <a:spcPts val="0"/>
         </a:spcAft>
       </a:defPPr>
-      <a:lvl1pPr lvl="0" marR="0" rtl="0" algn="l">
+      <a:lvl1pPr marR="0" lvl="0" algn="l" rtl="0">
         <a:lnSpc>
           <a:spcPct val="100000"/>
         </a:lnSpc>
@@ -4650,7 +4933,7 @@
           <a:spcPts val="0"/>
         </a:spcAft>
         <a:buNone/>
-        <a:defRPr b="0" i="0" sz="1400" u="none" cap="none" strike="noStrike">
+        <a:defRPr sz="1400" b="0" i="0" u="none" strike="noStrike" cap="none">
           <a:solidFill>
             <a:srgbClr val="000000"/>
           </a:solidFill>
@@ -4660,7 +4943,7 @@
           <a:sym typeface="Arial"/>
         </a:defRPr>
       </a:lvl1pPr>
-      <a:lvl2pPr lvl="1" marR="0" rtl="0" algn="l">
+      <a:lvl2pPr marR="0" lvl="1" algn="l" rtl="0">
         <a:lnSpc>
           <a:spcPct val="100000"/>
         </a:lnSpc>
@@ -4671,7 +4954,7 @@
           <a:spcPts val="0"/>
         </a:spcAft>
         <a:buNone/>
-        <a:defRPr b="0" i="0" sz="1400" u="none" cap="none" strike="noStrike">
+        <a:defRPr sz="1400" b="0" i="0" u="none" strike="noStrike" cap="none">
           <a:solidFill>
             <a:srgbClr val="000000"/>
           </a:solidFill>
@@ -4681,7 +4964,7 @@
           <a:sym typeface="Arial"/>
         </a:defRPr>
       </a:lvl2pPr>
-      <a:lvl3pPr lvl="2" marR="0" rtl="0" algn="l">
+      <a:lvl3pPr marR="0" lvl="2" algn="l" rtl="0">
         <a:lnSpc>
           <a:spcPct val="100000"/>
         </a:lnSpc>
@@ -4692,7 +4975,7 @@
           <a:spcPts val="0"/>
         </a:spcAft>
         <a:buNone/>
-        <a:defRPr b="0" i="0" sz="1400" u="none" cap="none" strike="noStrike">
+        <a:defRPr sz="1400" b="0" i="0" u="none" strike="noStrike" cap="none">
           <a:solidFill>
             <a:srgbClr val="000000"/>
           </a:solidFill>
@@ -4702,7 +4985,7 @@
           <a:sym typeface="Arial"/>
         </a:defRPr>
       </a:lvl3pPr>
-      <a:lvl4pPr lvl="3" marR="0" rtl="0" algn="l">
+      <a:lvl4pPr marR="0" lvl="3" algn="l" rtl="0">
         <a:lnSpc>
           <a:spcPct val="100000"/>
         </a:lnSpc>
@@ -4713,7 +4996,7 @@
           <a:spcPts val="0"/>
         </a:spcAft>
         <a:buNone/>
-        <a:defRPr b="0" i="0" sz="1400" u="none" cap="none" strike="noStrike">
+        <a:defRPr sz="1400" b="0" i="0" u="none" strike="noStrike" cap="none">
           <a:solidFill>
             <a:srgbClr val="000000"/>
           </a:solidFill>
@@ -4723,7 +5006,7 @@
           <a:sym typeface="Arial"/>
         </a:defRPr>
       </a:lvl4pPr>
-      <a:lvl5pPr lvl="4" marR="0" rtl="0" algn="l">
+      <a:lvl5pPr marR="0" lvl="4" algn="l" rtl="0">
         <a:lnSpc>
           <a:spcPct val="100000"/>
         </a:lnSpc>
@@ -4734,7 +5017,7 @@
           <a:spcPts val="0"/>
         </a:spcAft>
         <a:buNone/>
-        <a:defRPr b="0" i="0" sz="1400" u="none" cap="none" strike="noStrike">
+        <a:defRPr sz="1400" b="0" i="0" u="none" strike="noStrike" cap="none">
           <a:solidFill>
             <a:srgbClr val="000000"/>
           </a:solidFill>
@@ -4744,7 +5027,7 @@
           <a:sym typeface="Arial"/>
         </a:defRPr>
       </a:lvl5pPr>
-      <a:lvl6pPr lvl="5" marR="0" rtl="0" algn="l">
+      <a:lvl6pPr marR="0" lvl="5" algn="l" rtl="0">
         <a:lnSpc>
           <a:spcPct val="100000"/>
         </a:lnSpc>
@@ -4755,7 +5038,7 @@
           <a:spcPts val="0"/>
         </a:spcAft>
         <a:buNone/>
-        <a:defRPr b="0" i="0" sz="1400" u="none" cap="none" strike="noStrike">
+        <a:defRPr sz="1400" b="0" i="0" u="none" strike="noStrike" cap="none">
           <a:solidFill>
             <a:srgbClr val="000000"/>
           </a:solidFill>
@@ -4765,7 +5048,7 @@
           <a:sym typeface="Arial"/>
         </a:defRPr>
       </a:lvl6pPr>
-      <a:lvl7pPr lvl="6" marR="0" rtl="0" algn="l">
+      <a:lvl7pPr marR="0" lvl="6" algn="l" rtl="0">
         <a:lnSpc>
           <a:spcPct val="100000"/>
         </a:lnSpc>
@@ -4776,7 +5059,7 @@
           <a:spcPts val="0"/>
         </a:spcAft>
         <a:buNone/>
-        <a:defRPr b="0" i="0" sz="1400" u="none" cap="none" strike="noStrike">
+        <a:defRPr sz="1400" b="0" i="0" u="none" strike="noStrike" cap="none">
           <a:solidFill>
             <a:srgbClr val="000000"/>
           </a:solidFill>
@@ -4786,7 +5069,7 @@
           <a:sym typeface="Arial"/>
         </a:defRPr>
       </a:lvl7pPr>
-      <a:lvl8pPr lvl="7" marR="0" rtl="0" algn="l">
+      <a:lvl8pPr marR="0" lvl="7" algn="l" rtl="0">
         <a:lnSpc>
           <a:spcPct val="100000"/>
         </a:lnSpc>
@@ -4797,7 +5080,7 @@
           <a:spcPts val="0"/>
         </a:spcAft>
         <a:buNone/>
-        <a:defRPr b="0" i="0" sz="1400" u="none" cap="none" strike="noStrike">
+        <a:defRPr sz="1400" b="0" i="0" u="none" strike="noStrike" cap="none">
           <a:solidFill>
             <a:srgbClr val="000000"/>
           </a:solidFill>
@@ -4807,7 +5090,7 @@
           <a:sym typeface="Arial"/>
         </a:defRPr>
       </a:lvl8pPr>
-      <a:lvl9pPr lvl="8" marR="0" rtl="0" algn="l">
+      <a:lvl9pPr marR="0" lvl="8" algn="l" rtl="0">
         <a:lnSpc>
           <a:spcPct val="100000"/>
         </a:lnSpc>
@@ -4818,7 +5101,7 @@
           <a:spcPts val="0"/>
         </a:spcAft>
         <a:buNone/>
-        <a:defRPr b="0" i="0" sz="1400" u="none" cap="none" strike="noStrike">
+        <a:defRPr sz="1400" b="0" i="0" u="none" strike="noStrike" cap="none">
           <a:solidFill>
             <a:srgbClr val="000000"/>
           </a:solidFill>
@@ -4834,7 +5117,7 @@
 </file>
 
 <file path=ppt/slides/slide1.xml><?xml version="1.0" encoding="utf-8"?>
-<p:sld xmlns:a="http://schemas.openxmlformats.org/drawingml/2006/main" xmlns:r="http://schemas.openxmlformats.org/officeDocument/2006/relationships" xmlns:mc="http://schemas.openxmlformats.org/markup-compatibility/2006" xmlns:mv="urn:schemas-microsoft-com:mac:vml" xmlns:p="http://schemas.openxmlformats.org/presentationml/2006/main" xmlns:c="http://schemas.openxmlformats.org/drawingml/2006/chart" xmlns:dgm="http://schemas.openxmlformats.org/drawingml/2006/diagram" xmlns:o="urn:schemas-microsoft-com:office:office" xmlns:v="urn:schemas-microsoft-com:vml" xmlns:pvml="urn:schemas-microsoft-com:office:powerpoint" xmlns:com="http://schemas.openxmlformats.org/drawingml/2006/compatibility" xmlns:p14="http://schemas.microsoft.com/office/powerpoint/2010/main" xmlns:p15="http://schemas.microsoft.com/office/powerpoint/2012/main">
+<p:sld xmlns:a="http://schemas.openxmlformats.org/drawingml/2006/main" xmlns:r="http://schemas.openxmlformats.org/officeDocument/2006/relationships" xmlns:p="http://schemas.openxmlformats.org/presentationml/2006/main">
   <p:cSld>
     <p:bg>
       <p:bgPr>
@@ -4846,11 +5129,12 @@
             <a:fillRect/>
           </a:stretch>
         </a:blipFill>
+        <a:effectLst/>
       </p:bgPr>
     </p:bg>
     <p:spTree>
       <p:nvGrpSpPr>
-        <p:cNvPr id="58" name="Shape 58"/>
+        <p:cNvPr id="1" name="Shape 58"/>
         <p:cNvGrpSpPr/>
         <p:nvPr/>
       </p:nvGrpSpPr>
@@ -4879,21 +5163,23 @@
         </p:spPr>
         <p:txBody>
           <a:bodyPr>
-            <a:prstTxWarp prst="textPlain"/>
+            <a:prstTxWarp prst="textPlain">
+              <a:avLst/>
+            </a:prstTxWarp>
           </a:bodyPr>
           <a:lstStyle/>
           <a:p>
             <a:pPr lvl="0" algn="ctr"/>
             <a:r>
               <a:rPr b="0" i="0">
-                <a:ln cap="flat" cmpd="sng" w="28575">
+                <a:ln w="28575" cap="flat" cmpd="sng">
                   <a:solidFill>
                     <a:srgbClr val="000000"/>
                   </a:solidFill>
                   <a:prstDash val="solid"/>
                   <a:round/>
-                  <a:headEnd len="med" w="med" type="none"/>
-                  <a:tailEnd len="med" w="med" type="none"/>
+                  <a:headEnd type="none" w="med" len="med"/>
+                  <a:tailEnd type="none" w="med" len="med"/>
                 </a:ln>
                 <a:solidFill>
                   <a:srgbClr val="F3F3F3"/>
@@ -4914,11 +5200,11 @@
 </file>
 
 <file path=ppt/slides/slide2.xml><?xml version="1.0" encoding="utf-8"?>
-<p:sld xmlns:a="http://schemas.openxmlformats.org/drawingml/2006/main" xmlns:r="http://schemas.openxmlformats.org/officeDocument/2006/relationships" xmlns:mc="http://schemas.openxmlformats.org/markup-compatibility/2006" xmlns:mv="urn:schemas-microsoft-com:mac:vml" xmlns:p="http://schemas.openxmlformats.org/presentationml/2006/main" xmlns:c="http://schemas.openxmlformats.org/drawingml/2006/chart" xmlns:dgm="http://schemas.openxmlformats.org/drawingml/2006/diagram" xmlns:o="urn:schemas-microsoft-com:office:office" xmlns:v="urn:schemas-microsoft-com:vml" xmlns:pvml="urn:schemas-microsoft-com:office:powerpoint" xmlns:com="http://schemas.openxmlformats.org/drawingml/2006/compatibility" xmlns:p14="http://schemas.microsoft.com/office/powerpoint/2010/main" xmlns:p15="http://schemas.microsoft.com/office/powerpoint/2012/main">
+<p:sld xmlns:a="http://schemas.openxmlformats.org/drawingml/2006/main" xmlns:r="http://schemas.openxmlformats.org/officeDocument/2006/relationships" xmlns:p="http://schemas.openxmlformats.org/presentationml/2006/main">
   <p:cSld>
     <p:spTree>
       <p:nvGrpSpPr>
-        <p:cNvPr id="63" name="Shape 63"/>
+        <p:cNvPr id="1" name="Shape 63"/>
         <p:cNvGrpSpPr/>
         <p:nvPr/>
       </p:nvGrpSpPr>
@@ -4933,7 +5219,9 @@
       <p:sp>
         <p:nvSpPr>
           <p:cNvPr id="64" name="Shape 64"/>
-          <p:cNvSpPr txBox="1"/>
+          <p:cNvSpPr txBox="1">
+            <a:spLocks noGrp="1"/>
+          </p:cNvSpPr>
           <p:nvPr>
             <p:ph type="title"/>
           </p:nvPr>
@@ -4948,7 +5236,7 @@
           </a:prstGeom>
         </p:spPr>
         <p:txBody>
-          <a:bodyPr anchorCtr="0" anchor="t" bIns="91425" lIns="91425" rIns="91425" wrap="square" tIns="91425">
+          <a:bodyPr wrap="square" lIns="91425" tIns="91425" rIns="91425" bIns="91425" anchor="t" anchorCtr="0">
             <a:noAutofit/>
           </a:bodyPr>
           <a:lstStyle/>
@@ -4969,9 +5257,11 @@
       <p:sp>
         <p:nvSpPr>
           <p:cNvPr id="65" name="Shape 65"/>
-          <p:cNvSpPr txBox="1"/>
+          <p:cNvSpPr txBox="1">
+            <a:spLocks noGrp="1"/>
+          </p:cNvSpPr>
           <p:nvPr>
-            <p:ph idx="1" type="body"/>
+            <p:ph type="body" idx="1"/>
           </p:nvPr>
         </p:nvSpPr>
         <p:spPr>
@@ -4984,12 +5274,12 @@
           </a:prstGeom>
         </p:spPr>
         <p:txBody>
-          <a:bodyPr anchorCtr="0" anchor="t" bIns="91425" lIns="91425" rIns="91425" wrap="square" tIns="91425">
+          <a:bodyPr wrap="square" lIns="91425" tIns="91425" rIns="91425" bIns="91425" anchor="t" anchorCtr="0">
             <a:noAutofit/>
           </a:bodyPr>
           <a:lstStyle/>
           <a:p>
-            <a:pPr indent="-228600" lvl="0" marL="457200" rtl="0">
+            <a:pPr marL="457200" lvl="0" indent="-228600" rtl="0">
               <a:spcBef>
                 <a:spcPts val="0"/>
               </a:spcBef>
@@ -5008,7 +5298,7 @@
             </a:r>
           </a:p>
           <a:p>
-            <a:pPr indent="-228600" lvl="0" marL="457200" rtl="0">
+            <a:pPr marL="457200" lvl="0" indent="-228600" rtl="0">
               <a:spcBef>
                 <a:spcPts val="0"/>
               </a:spcBef>
@@ -5027,7 +5317,7 @@
             </a:r>
           </a:p>
           <a:p>
-            <a:pPr indent="-228600" lvl="0" marL="457200" rtl="0">
+            <a:pPr marL="457200" lvl="0" indent="-228600" rtl="0">
               <a:spcBef>
                 <a:spcPts val="0"/>
               </a:spcBef>
@@ -5046,7 +5336,7 @@
             </a:r>
           </a:p>
           <a:p>
-            <a:pPr indent="-228600" lvl="0" marL="457200" rtl="0">
+            <a:pPr marL="457200" lvl="0" indent="-228600" rtl="0">
               <a:spcBef>
                 <a:spcPts val="0"/>
               </a:spcBef>
@@ -5061,23 +5351,7 @@
                   <a:srgbClr val="000000"/>
                 </a:solidFill>
               </a:rPr>
-              <a:t>Potential </a:t>
-            </a:r>
-            <a:r>
-              <a:rPr lang="en">
-                <a:solidFill>
-                  <a:srgbClr val="000000"/>
-                </a:solidFill>
-              </a:rPr>
-              <a:t>Tech</a:t>
-            </a:r>
-            <a:r>
-              <a:rPr lang="en">
-                <a:solidFill>
-                  <a:srgbClr val="000000"/>
-                </a:solidFill>
-              </a:rPr>
-              <a:t> Stack</a:t>
+              <a:t>Potential Tech Stack</a:t>
             </a:r>
           </a:p>
         </p:txBody>
@@ -5091,11 +5365,11 @@
 </file>
 
 <file path=ppt/slides/slide3.xml><?xml version="1.0" encoding="utf-8"?>
-<p:sld xmlns:a="http://schemas.openxmlformats.org/drawingml/2006/main" xmlns:r="http://schemas.openxmlformats.org/officeDocument/2006/relationships" xmlns:mc="http://schemas.openxmlformats.org/markup-compatibility/2006" xmlns:mv="urn:schemas-microsoft-com:mac:vml" xmlns:p="http://schemas.openxmlformats.org/presentationml/2006/main" xmlns:c="http://schemas.openxmlformats.org/drawingml/2006/chart" xmlns:dgm="http://schemas.openxmlformats.org/drawingml/2006/diagram" xmlns:o="urn:schemas-microsoft-com:office:office" xmlns:v="urn:schemas-microsoft-com:vml" xmlns:pvml="urn:schemas-microsoft-com:office:powerpoint" xmlns:com="http://schemas.openxmlformats.org/drawingml/2006/compatibility" xmlns:p14="http://schemas.microsoft.com/office/powerpoint/2010/main" xmlns:p15="http://schemas.microsoft.com/office/powerpoint/2012/main">
+<p:sld xmlns:a="http://schemas.openxmlformats.org/drawingml/2006/main" xmlns:r="http://schemas.openxmlformats.org/officeDocument/2006/relationships" xmlns:p="http://schemas.openxmlformats.org/presentationml/2006/main">
   <p:cSld>
     <p:spTree>
       <p:nvGrpSpPr>
-        <p:cNvPr id="69" name="Shape 69"/>
+        <p:cNvPr id="1" name="Shape 69"/>
         <p:cNvGrpSpPr/>
         <p:nvPr/>
       </p:nvGrpSpPr>
@@ -5110,7 +5384,9 @@
       <p:sp>
         <p:nvSpPr>
           <p:cNvPr id="70" name="Shape 70"/>
-          <p:cNvSpPr txBox="1"/>
+          <p:cNvSpPr txBox="1">
+            <a:spLocks noGrp="1"/>
+          </p:cNvSpPr>
           <p:nvPr>
             <p:ph type="title"/>
           </p:nvPr>
@@ -5125,7 +5401,7 @@
           </a:prstGeom>
         </p:spPr>
         <p:txBody>
-          <a:bodyPr anchorCtr="0" anchor="t" bIns="91425" lIns="91425" rIns="91425" wrap="square" tIns="91425">
+          <a:bodyPr wrap="square" lIns="91425" tIns="91425" rIns="91425" bIns="91425" anchor="t" anchorCtr="0">
             <a:noAutofit/>
           </a:bodyPr>
           <a:lstStyle/>
@@ -5146,9 +5422,11 @@
       <p:sp>
         <p:nvSpPr>
           <p:cNvPr id="71" name="Shape 71"/>
-          <p:cNvSpPr txBox="1"/>
+          <p:cNvSpPr txBox="1">
+            <a:spLocks noGrp="1"/>
+          </p:cNvSpPr>
           <p:nvPr>
-            <p:ph idx="1" type="body"/>
+            <p:ph type="body" idx="1"/>
           </p:nvPr>
         </p:nvSpPr>
         <p:spPr>
@@ -5161,12 +5439,12 @@
           </a:prstGeom>
         </p:spPr>
         <p:txBody>
-          <a:bodyPr anchorCtr="0" anchor="t" bIns="91425" lIns="91425" rIns="91425" wrap="square" tIns="91425">
+          <a:bodyPr wrap="square" lIns="91425" tIns="91425" rIns="91425" bIns="91425" anchor="t" anchorCtr="0">
             <a:noAutofit/>
           </a:bodyPr>
           <a:lstStyle/>
           <a:p>
-            <a:pPr indent="-228600" lvl="0" marL="457200">
+            <a:pPr marL="457200" lvl="0" indent="-228600">
               <a:spcBef>
                 <a:spcPts val="0"/>
               </a:spcBef>
@@ -5185,7 +5463,7 @@
             </a:r>
           </a:p>
           <a:p>
-            <a:pPr indent="-228600" lvl="0" marL="457200">
+            <a:pPr marL="457200" lvl="0" indent="-228600">
               <a:spcBef>
                 <a:spcPts val="0"/>
               </a:spcBef>
@@ -5200,15 +5478,7 @@
                   <a:srgbClr val="000000"/>
                 </a:solidFill>
               </a:rPr>
-              <a:t>Employees will have the ability to add and edit company </a:t>
-            </a:r>
-            <a:r>
-              <a:rPr lang="en">
-                <a:solidFill>
-                  <a:srgbClr val="000000"/>
-                </a:solidFill>
-              </a:rPr>
-              <a:t>terminology.</a:t>
+              <a:t>Employees will have the ability to add and edit company terminology.</a:t>
             </a:r>
           </a:p>
           <a:p>
@@ -5218,9 +5488,6 @@
               </a:spcBef>
               <a:buNone/>
             </a:pPr>
-            <a:r>
-              <a:t/>
-            </a:r>
             <a:endParaRPr>
               <a:solidFill>
                 <a:srgbClr val="000000"/>
@@ -5231,7 +5498,7 @@
       </p:sp>
       <p:pic>
         <p:nvPicPr>
-          <p:cNvPr descr="androiddictionary.jpg" id="72" name="Shape 72"/>
+          <p:cNvPr id="72" name="Shape 72" descr="androiddictionary.jpg"/>
           <p:cNvPicPr preferRelativeResize="0"/>
           <p:nvPr/>
         </p:nvPicPr>
@@ -5266,11 +5533,11 @@
 </file>
 
 <file path=ppt/slides/slide4.xml><?xml version="1.0" encoding="utf-8"?>
-<p:sld xmlns:a="http://schemas.openxmlformats.org/drawingml/2006/main" xmlns:r="http://schemas.openxmlformats.org/officeDocument/2006/relationships" xmlns:mc="http://schemas.openxmlformats.org/markup-compatibility/2006" xmlns:mv="urn:schemas-microsoft-com:mac:vml" xmlns:p="http://schemas.openxmlformats.org/presentationml/2006/main" xmlns:c="http://schemas.openxmlformats.org/drawingml/2006/chart" xmlns:dgm="http://schemas.openxmlformats.org/drawingml/2006/diagram" xmlns:o="urn:schemas-microsoft-com:office:office" xmlns:v="urn:schemas-microsoft-com:vml" xmlns:pvml="urn:schemas-microsoft-com:office:powerpoint" xmlns:com="http://schemas.openxmlformats.org/drawingml/2006/compatibility" xmlns:p14="http://schemas.microsoft.com/office/powerpoint/2010/main" xmlns:p15="http://schemas.microsoft.com/office/powerpoint/2012/main">
+<p:sld xmlns:a="http://schemas.openxmlformats.org/drawingml/2006/main" xmlns:r="http://schemas.openxmlformats.org/officeDocument/2006/relationships" xmlns:p="http://schemas.openxmlformats.org/presentationml/2006/main">
   <p:cSld>
     <p:spTree>
       <p:nvGrpSpPr>
-        <p:cNvPr id="76" name="Shape 76"/>
+        <p:cNvPr id="1" name="Shape 76"/>
         <p:cNvGrpSpPr/>
         <p:nvPr/>
       </p:nvGrpSpPr>
@@ -5284,7 +5551,7 @@
       </p:grpSpPr>
       <p:pic>
         <p:nvPicPr>
-          <p:cNvPr descr="AAEAAQAAAAAAAAQZAAAAJGY5NjNlMWI4LWFhYTEtNGYzZC05OGEwLTQwNWQyYmRkNmU4NQ.jpg" id="77" name="Shape 77"/>
+          <p:cNvPr id="77" name="Shape 77" descr="AAEAAQAAAAAAAAQZAAAAJGY5NjNlMWI4LWFhYTEtNGYzZC05OGEwLTQwNWQyYmRkNmU4NQ.jpg"/>
           <p:cNvPicPr preferRelativeResize="0"/>
           <p:nvPr/>
         </p:nvPicPr>
@@ -5330,12 +5597,12 @@
           </a:ln>
         </p:spPr>
         <p:txBody>
-          <a:bodyPr anchorCtr="0" anchor="t" bIns="91425" lIns="91425" rIns="91425" wrap="square" tIns="91425">
+          <a:bodyPr wrap="square" lIns="91425" tIns="91425" rIns="91425" bIns="91425" anchor="t" anchorCtr="0">
             <a:noAutofit/>
           </a:bodyPr>
           <a:lstStyle/>
           <a:p>
-            <a:pPr indent="-342900" lvl="0" marL="457200" rtl="0">
+            <a:pPr marL="457200" lvl="0" indent="-342900" rtl="0">
               <a:spcBef>
                 <a:spcPts val="0"/>
               </a:spcBef>
@@ -5354,7 +5621,7 @@
             </a:r>
           </a:p>
           <a:p>
-            <a:pPr indent="-342900" lvl="0" marL="457200" rtl="0">
+            <a:pPr marL="457200" lvl="0" indent="-342900" rtl="0">
               <a:spcBef>
                 <a:spcPts val="0"/>
               </a:spcBef>
@@ -5373,7 +5640,7 @@
             </a:r>
           </a:p>
           <a:p>
-            <a:pPr indent="-342900" lvl="0" marL="457200" rtl="0">
+            <a:pPr marL="457200" lvl="0" indent="-342900" rtl="0">
               <a:spcBef>
                 <a:spcPts val="0"/>
               </a:spcBef>
@@ -5392,7 +5659,7 @@
             </a:r>
           </a:p>
           <a:p>
-            <a:pPr indent="-342900" lvl="0" marL="457200" rtl="0">
+            <a:pPr marL="457200" lvl="0" indent="-342900" rtl="0">
               <a:spcBef>
                 <a:spcPts val="0"/>
               </a:spcBef>
@@ -5411,7 +5678,7 @@
             </a:r>
           </a:p>
           <a:p>
-            <a:pPr indent="-342900" lvl="0" marL="457200" rtl="0">
+            <a:pPr marL="457200" lvl="0" indent="-342900" rtl="0">
               <a:spcBef>
                 <a:spcPts val="0"/>
               </a:spcBef>
@@ -5430,7 +5697,7 @@
             </a:r>
           </a:p>
           <a:p>
-            <a:pPr indent="-342900" lvl="0" marL="457200" marR="0" rtl="0" algn="l">
+            <a:pPr marL="457200" marR="0" lvl="0" indent="-342900" algn="l" rtl="0">
               <a:lnSpc>
                 <a:spcPct val="115000"/>
               </a:lnSpc>
@@ -5479,7 +5746,7 @@
           </a:ln>
         </p:spPr>
         <p:txBody>
-          <a:bodyPr anchorCtr="0" anchor="t" bIns="91425" lIns="91425" rIns="91425" wrap="square" tIns="91425">
+          <a:bodyPr wrap="square" lIns="91425" tIns="91425" rIns="91425" bIns="91425" anchor="t" anchorCtr="0">
             <a:noAutofit/>
           </a:bodyPr>
           <a:lstStyle/>
@@ -5511,11 +5778,11 @@
 </file>
 
 <file path=ppt/slides/slide5.xml><?xml version="1.0" encoding="utf-8"?>
-<p:sld xmlns:a="http://schemas.openxmlformats.org/drawingml/2006/main" xmlns:r="http://schemas.openxmlformats.org/officeDocument/2006/relationships" xmlns:mc="http://schemas.openxmlformats.org/markup-compatibility/2006" xmlns:mv="urn:schemas-microsoft-com:mac:vml" xmlns:p="http://schemas.openxmlformats.org/presentationml/2006/main" xmlns:c="http://schemas.openxmlformats.org/drawingml/2006/chart" xmlns:dgm="http://schemas.openxmlformats.org/drawingml/2006/diagram" xmlns:o="urn:schemas-microsoft-com:office:office" xmlns:v="urn:schemas-microsoft-com:vml" xmlns:pvml="urn:schemas-microsoft-com:office:powerpoint" xmlns:com="http://schemas.openxmlformats.org/drawingml/2006/compatibility" xmlns:p14="http://schemas.microsoft.com/office/powerpoint/2010/main" xmlns:p15="http://schemas.microsoft.com/office/powerpoint/2012/main">
+<p:sld xmlns:a="http://schemas.openxmlformats.org/drawingml/2006/main" xmlns:r="http://schemas.openxmlformats.org/officeDocument/2006/relationships" xmlns:p="http://schemas.openxmlformats.org/presentationml/2006/main">
   <p:cSld>
     <p:spTree>
       <p:nvGrpSpPr>
-        <p:cNvPr id="83" name="Shape 83"/>
+        <p:cNvPr id="1" name="Shape 83"/>
         <p:cNvGrpSpPr/>
         <p:nvPr/>
       </p:nvGrpSpPr>
@@ -5530,7 +5797,9 @@
       <p:sp>
         <p:nvSpPr>
           <p:cNvPr id="84" name="Shape 84"/>
-          <p:cNvSpPr txBox="1"/>
+          <p:cNvSpPr txBox="1">
+            <a:spLocks noGrp="1"/>
+          </p:cNvSpPr>
           <p:nvPr>
             <p:ph type="title"/>
           </p:nvPr>
@@ -5545,7 +5814,7 @@
           </a:prstGeom>
         </p:spPr>
         <p:txBody>
-          <a:bodyPr anchorCtr="0" anchor="t" bIns="91425" lIns="91425" rIns="91425" wrap="square" tIns="91425">
+          <a:bodyPr wrap="square" lIns="91425" tIns="91425" rIns="91425" bIns="91425" anchor="t" anchorCtr="0">
             <a:noAutofit/>
           </a:bodyPr>
           <a:lstStyle/>
@@ -5566,9 +5835,11 @@
       <p:sp>
         <p:nvSpPr>
           <p:cNvPr id="85" name="Shape 85"/>
-          <p:cNvSpPr txBox="1"/>
+          <p:cNvSpPr txBox="1">
+            <a:spLocks noGrp="1"/>
+          </p:cNvSpPr>
           <p:nvPr>
-            <p:ph idx="1" type="body"/>
+            <p:ph type="body" idx="1"/>
           </p:nvPr>
         </p:nvSpPr>
         <p:spPr>
@@ -5581,12 +5852,12 @@
           </a:prstGeom>
         </p:spPr>
         <p:txBody>
-          <a:bodyPr anchorCtr="0" anchor="t" bIns="91425" lIns="91425" rIns="91425" wrap="square" tIns="91425">
+          <a:bodyPr wrap="square" lIns="91425" tIns="91425" rIns="91425" bIns="91425" anchor="t" anchorCtr="0">
             <a:noAutofit/>
           </a:bodyPr>
           <a:lstStyle/>
           <a:p>
-            <a:pPr indent="-228600" lvl="0" marL="457200" rtl="0">
+            <a:pPr marL="457200" lvl="0" indent="-228600" rtl="0">
               <a:spcBef>
                 <a:spcPts val="0"/>
               </a:spcBef>
@@ -5598,7 +5869,7 @@
             </a:r>
           </a:p>
           <a:p>
-            <a:pPr indent="-228600" lvl="0" marL="457200" rtl="0">
+            <a:pPr marL="457200" lvl="0" indent="-228600" rtl="0">
               <a:spcBef>
                 <a:spcPts val="0"/>
               </a:spcBef>
@@ -5610,7 +5881,7 @@
             </a:r>
           </a:p>
           <a:p>
-            <a:pPr indent="-228600" lvl="0" marL="457200" rtl="0">
+            <a:pPr marL="457200" lvl="0" indent="-228600" rtl="0">
               <a:spcBef>
                 <a:spcPts val="0"/>
               </a:spcBef>
@@ -5625,7 +5896,7 @@
       </p:sp>
       <p:pic>
         <p:nvPicPr>
-          <p:cNvPr descr="nyc-creative-workspaces-sohosoleil.jpg" id="86" name="Shape 86"/>
+          <p:cNvPr id="86" name="Shape 86" descr="nyc-creative-workspaces-sohosoleil.jpg"/>
           <p:cNvPicPr preferRelativeResize="0"/>
           <p:nvPr/>
         </p:nvPicPr>
@@ -5660,11 +5931,11 @@
 </file>
 
 <file path=ppt/slides/slide6.xml><?xml version="1.0" encoding="utf-8"?>
-<p:sld xmlns:a="http://schemas.openxmlformats.org/drawingml/2006/main" xmlns:r="http://schemas.openxmlformats.org/officeDocument/2006/relationships" xmlns:mc="http://schemas.openxmlformats.org/markup-compatibility/2006" xmlns:mv="urn:schemas-microsoft-com:mac:vml" xmlns:p="http://schemas.openxmlformats.org/presentationml/2006/main" xmlns:c="http://schemas.openxmlformats.org/drawingml/2006/chart" xmlns:dgm="http://schemas.openxmlformats.org/drawingml/2006/diagram" xmlns:o="urn:schemas-microsoft-com:office:office" xmlns:v="urn:schemas-microsoft-com:vml" xmlns:pvml="urn:schemas-microsoft-com:office:powerpoint" xmlns:com="http://schemas.openxmlformats.org/drawingml/2006/compatibility" xmlns:p14="http://schemas.microsoft.com/office/powerpoint/2010/main" xmlns:p15="http://schemas.microsoft.com/office/powerpoint/2012/main">
+<p:sld xmlns:a="http://schemas.openxmlformats.org/drawingml/2006/main" xmlns:r="http://schemas.openxmlformats.org/officeDocument/2006/relationships" xmlns:p="http://schemas.openxmlformats.org/presentationml/2006/main">
   <p:cSld>
     <p:spTree>
       <p:nvGrpSpPr>
-        <p:cNvPr id="90" name="Shape 90"/>
+        <p:cNvPr id="1" name="Shape 90"/>
         <p:cNvGrpSpPr/>
         <p:nvPr/>
       </p:nvGrpSpPr>
@@ -5679,7 +5950,9 @@
       <p:sp>
         <p:nvSpPr>
           <p:cNvPr id="91" name="Shape 91"/>
-          <p:cNvSpPr txBox="1"/>
+          <p:cNvSpPr txBox="1">
+            <a:spLocks noGrp="1"/>
+          </p:cNvSpPr>
           <p:nvPr>
             <p:ph type="title"/>
           </p:nvPr>
@@ -5694,7 +5967,7 @@
           </a:prstGeom>
         </p:spPr>
         <p:txBody>
-          <a:bodyPr anchorCtr="0" anchor="t" bIns="91425" lIns="91425" rIns="91425" wrap="square" tIns="91425">
+          <a:bodyPr wrap="square" lIns="91425" tIns="91425" rIns="91425" bIns="91425" anchor="t" anchorCtr="0">
             <a:noAutofit/>
           </a:bodyPr>
           <a:lstStyle/>
@@ -5715,9 +5988,11 @@
       <p:sp>
         <p:nvSpPr>
           <p:cNvPr id="92" name="Shape 92"/>
-          <p:cNvSpPr txBox="1"/>
+          <p:cNvSpPr txBox="1">
+            <a:spLocks noGrp="1"/>
+          </p:cNvSpPr>
           <p:nvPr>
-            <p:ph idx="1" type="body"/>
+            <p:ph type="body" idx="1"/>
           </p:nvPr>
         </p:nvSpPr>
         <p:spPr>
@@ -5730,12 +6005,12 @@
           </a:prstGeom>
         </p:spPr>
         <p:txBody>
-          <a:bodyPr anchorCtr="0" anchor="t" bIns="91425" lIns="91425" rIns="91425" wrap="square" tIns="91425">
+          <a:bodyPr wrap="square" lIns="91425" tIns="91425" rIns="91425" bIns="91425" anchor="t" anchorCtr="0">
             <a:noAutofit/>
           </a:bodyPr>
           <a:lstStyle/>
           <a:p>
-            <a:pPr indent="-228600" lvl="0" marL="457200" rtl="0">
+            <a:pPr marL="457200" lvl="0" indent="-228600" rtl="0">
               <a:spcBef>
                 <a:spcPts val="0"/>
               </a:spcBef>
@@ -5748,7 +6023,7 @@
               <a:buChar char="❖"/>
             </a:pPr>
             <a:r>
-              <a:rPr lang="en">
+              <a:rPr lang="en" dirty="0">
                 <a:solidFill>
                   <a:srgbClr val="000000"/>
                 </a:solidFill>
@@ -5757,7 +6032,98 @@
             </a:r>
           </a:p>
           <a:p>
-            <a:pPr indent="-342900" lvl="1" marL="914400" rtl="0">
+            <a:pPr marL="914400" lvl="1" indent="-342900" rtl="0">
+              <a:spcBef>
+                <a:spcPts val="0"/>
+              </a:spcBef>
+              <a:spcAft>
+                <a:spcPts val="0"/>
+              </a:spcAft>
+              <a:buClr>
+                <a:srgbClr val="000000"/>
+              </a:buClr>
+              <a:buSzPct val="100000"/>
+              <a:buChar char="➢"/>
+            </a:pPr>
+            <a:r>
+              <a:rPr lang="en" sz="1800" dirty="0">
+                <a:solidFill>
+                  <a:srgbClr val="000000"/>
+                </a:solidFill>
+              </a:rPr>
+              <a:t>Ionic frameworks (html/css/js)</a:t>
+            </a:r>
+          </a:p>
+          <a:p>
+            <a:pPr marL="457200" lvl="0" indent="-228600" rtl="0">
+              <a:spcBef>
+                <a:spcPts val="0"/>
+              </a:spcBef>
+              <a:spcAft>
+                <a:spcPts val="0"/>
+              </a:spcAft>
+              <a:buClr>
+                <a:srgbClr val="000000"/>
+              </a:buClr>
+              <a:buChar char="❖"/>
+            </a:pPr>
+            <a:r>
+              <a:rPr lang="en" dirty="0">
+                <a:solidFill>
+                  <a:srgbClr val="000000"/>
+                </a:solidFill>
+              </a:rPr>
+              <a:t>Backend development (possible)</a:t>
+            </a:r>
+          </a:p>
+          <a:p>
+            <a:pPr marL="914400" lvl="1" indent="-342900" rtl="0">
+              <a:spcBef>
+                <a:spcPts val="0"/>
+              </a:spcBef>
+              <a:spcAft>
+                <a:spcPts val="0"/>
+              </a:spcAft>
+              <a:buClr>
+                <a:srgbClr val="000000"/>
+              </a:buClr>
+              <a:buSzPct val="100000"/>
+              <a:buChar char="➢"/>
+            </a:pPr>
+            <a:r>
+              <a:rPr lang="en" sz="1800" dirty="0">
+                <a:solidFill>
+                  <a:srgbClr val="000000"/>
+                </a:solidFill>
+              </a:rPr>
+              <a:t>Node.js </a:t>
+            </a:r>
+          </a:p>
+          <a:p>
+            <a:pPr marL="914400" lvl="1" indent="-342900" rtl="0">
+              <a:spcBef>
+                <a:spcPts val="0"/>
+              </a:spcBef>
+              <a:spcAft>
+                <a:spcPts val="0"/>
+              </a:spcAft>
+              <a:buClr>
+                <a:srgbClr val="000000"/>
+              </a:buClr>
+              <a:buSzPct val="100000"/>
+              <a:buChar char="➢"/>
+            </a:pPr>
+            <a:r>
+              <a:rPr lang="en" sz="1800" dirty="0">
+                <a:solidFill>
+                  <a:srgbClr val="000000"/>
+                </a:solidFill>
+              </a:rPr>
+              <a:t>Microsoft Azure</a:t>
+            </a:r>
+          </a:p>
+          <a:p>
+            <a:pPr marL="914400" lvl="1" indent="-342900" rtl="0">
               <a:spcBef>
                 <a:spcPts val="0"/>
               </a:spcBef>
@@ -5776,140 +6142,15 @@
                   <a:srgbClr val="000000"/>
                 </a:solidFill>
               </a:rPr>
-              <a:t>Ionic frameworks (html/css/js)</a:t>
-            </a:r>
-          </a:p>
-          <a:p>
-            <a:pPr indent="-228600" lvl="0" marL="457200" rtl="0">
-              <a:spcBef>
-                <a:spcPts val="0"/>
-              </a:spcBef>
-              <a:spcAft>
-                <a:spcPts val="0"/>
-              </a:spcAft>
-              <a:buClr>
-                <a:srgbClr val="000000"/>
-              </a:buClr>
-              <a:buChar char="❖"/>
-            </a:pPr>
-            <a:r>
-              <a:rPr lang="en">
-                <a:solidFill>
-                  <a:srgbClr val="000000"/>
-                </a:solidFill>
-              </a:rPr>
-              <a:t>Backend development (possible)</a:t>
-            </a:r>
-          </a:p>
-          <a:p>
-            <a:pPr indent="-342900" lvl="1" marL="914400" rtl="0">
-              <a:spcBef>
-                <a:spcPts val="0"/>
-              </a:spcBef>
-              <a:spcAft>
-                <a:spcPts val="0"/>
-              </a:spcAft>
-              <a:buClr>
-                <a:srgbClr val="000000"/>
-              </a:buClr>
-              <a:buSzPct val="100000"/>
-              <a:buChar char="➢"/>
-            </a:pPr>
-            <a:r>
-              <a:rPr lang="en" sz="1800">
-                <a:solidFill>
-                  <a:srgbClr val="000000"/>
-                </a:solidFill>
-              </a:rPr>
-              <a:t>Node.js </a:t>
-            </a:r>
-          </a:p>
-          <a:p>
-            <a:pPr indent="-342900" lvl="1" marL="914400" rtl="0">
-              <a:spcBef>
-                <a:spcPts val="0"/>
-              </a:spcBef>
-              <a:spcAft>
-                <a:spcPts val="0"/>
-              </a:spcAft>
-              <a:buClr>
-                <a:srgbClr val="000000"/>
-              </a:buClr>
-              <a:buSzPct val="100000"/>
-              <a:buChar char="➢"/>
-            </a:pPr>
-            <a:r>
-              <a:rPr lang="en" sz="1800">
-                <a:solidFill>
-                  <a:srgbClr val="000000"/>
-                </a:solidFill>
-              </a:rPr>
-              <a:t>Microsoft Azure</a:t>
-            </a:r>
-          </a:p>
-          <a:p>
-            <a:pPr indent="-342900" lvl="1" marL="914400" rtl="0">
-              <a:spcBef>
-                <a:spcPts val="0"/>
-              </a:spcBef>
-              <a:spcAft>
-                <a:spcPts val="0"/>
-              </a:spcAft>
-              <a:buClr>
-                <a:srgbClr val="000000"/>
-              </a:buClr>
-              <a:buSzPct val="100000"/>
-              <a:buChar char="➢"/>
-            </a:pPr>
-            <a:r>
-              <a:rPr lang="en" sz="1800">
-                <a:solidFill>
-                  <a:srgbClr val="000000"/>
-                </a:solidFill>
-              </a:rPr>
               <a:t>Webstorm IDE</a:t>
             </a:r>
-          </a:p>
-          <a:p>
-            <a:pPr indent="-342900" lvl="1" marL="914400" rtl="0">
-              <a:spcBef>
-                <a:spcPts val="0"/>
-              </a:spcBef>
-              <a:spcAft>
-                <a:spcPts val="0"/>
-              </a:spcAft>
-              <a:buClr>
-                <a:srgbClr val="000000"/>
-              </a:buClr>
-              <a:buSzPct val="100000"/>
-              <a:buChar char="➢"/>
-            </a:pPr>
-            <a:r>
-              <a:rPr lang="en" sz="1800">
-                <a:solidFill>
-                  <a:srgbClr val="000000"/>
-                </a:solidFill>
-              </a:rPr>
-              <a:t>JavaScript</a:t>
-            </a:r>
-          </a:p>
-          <a:p>
-            <a:pPr lvl="0">
-              <a:spcBef>
-                <a:spcPts val="0"/>
-              </a:spcBef>
-              <a:buNone/>
-            </a:pPr>
-            <a:r>
-              <a:t/>
-            </a:r>
-            <a:endParaRPr/>
+            <a:endParaRPr dirty="0"/>
           </a:p>
         </p:txBody>
       </p:sp>
       <p:pic>
         <p:nvPicPr>
-          <p:cNvPr descr="7556691542_95d90c2f17_b.jpg" id="93" name="Shape 93"/>
+          <p:cNvPr id="93" name="Shape 93" descr="7556691542_95d90c2f17_b.jpg"/>
           <p:cNvPicPr preferRelativeResize="0"/>
           <p:nvPr/>
         </p:nvPicPr>
@@ -5944,7 +6185,288 @@
 </file>
 
 <file path=ppt/theme/theme1.xml><?xml version="1.0" encoding="utf-8"?>
-<a:theme xmlns:a="http://schemas.openxmlformats.org/drawingml/2006/main" xmlns:r="http://schemas.openxmlformats.org/officeDocument/2006/relationships" name="Custom Theme">
+<a:theme xmlns:a="http://schemas.openxmlformats.org/drawingml/2006/main" name="Paperback">
+  <a:themeElements>
+    <a:clrScheme name="Paperback">
+      <a:dk1>
+        <a:srgbClr val="000000"/>
+      </a:dk1>
+      <a:lt1>
+        <a:srgbClr val="FFFFFF"/>
+      </a:lt1>
+      <a:dk2>
+        <a:srgbClr val="00695C"/>
+      </a:dk2>
+      <a:lt2>
+        <a:srgbClr val="26A69A"/>
+      </a:lt2>
+      <a:accent1>
+        <a:srgbClr val="FFFBF0"/>
+      </a:accent1>
+      <a:accent2>
+        <a:srgbClr val="B7B7B7"/>
+      </a:accent2>
+      <a:accent3>
+        <a:srgbClr val="FB8C00"/>
+      </a:accent3>
+      <a:accent4>
+        <a:srgbClr val="80CBC4"/>
+      </a:accent4>
+      <a:accent5>
+        <a:srgbClr val="AF4345"/>
+      </a:accent5>
+      <a:accent6>
+        <a:srgbClr val="F58F8F"/>
+      </a:accent6>
+      <a:hlink>
+        <a:srgbClr val="AF4345"/>
+      </a:hlink>
+      <a:folHlink>
+        <a:srgbClr val="AF4345"/>
+      </a:folHlink>
+    </a:clrScheme>
+    <a:fontScheme name="Office">
+      <a:majorFont>
+        <a:latin typeface="Arial"/>
+        <a:ea typeface=""/>
+        <a:cs typeface=""/>
+        <a:font script="Jpan" typeface="ＭＳ Ｐゴシック"/>
+        <a:font script="Hang" typeface="맑은 고딕"/>
+        <a:font script="Hans" typeface="宋体"/>
+        <a:font script="Hant" typeface="新細明體"/>
+        <a:font script="Arab" typeface="Times New Roman"/>
+        <a:font script="Hebr" typeface="Times New Roman"/>
+        <a:font script="Thai" typeface="Angsana New"/>
+        <a:font script="Ethi" typeface="Nyala"/>
+        <a:font script="Beng" typeface="Vrinda"/>
+        <a:font script="Gujr" typeface="Shruti"/>
+        <a:font script="Khmr" typeface="MoolBoran"/>
+        <a:font script="Knda" typeface="Tunga"/>
+        <a:font script="Guru" typeface="Raavi"/>
+        <a:font script="Cans" typeface="Euphemia"/>
+        <a:font script="Cher" typeface="Plantagenet Cherokee"/>
+        <a:font script="Yiii" typeface="Microsoft Yi Baiti"/>
+        <a:font script="Tibt" typeface="Microsoft Himalaya"/>
+        <a:font script="Thaa" typeface="MV Boli"/>
+        <a:font script="Deva" typeface="Mangal"/>
+        <a:font script="Telu" typeface="Gautami"/>
+        <a:font script="Taml" typeface="Latha"/>
+        <a:font script="Syrc" typeface="Estrangelo Edessa"/>
+        <a:font script="Orya" typeface="Kalinga"/>
+        <a:font script="Mlym" typeface="Kartika"/>
+        <a:font script="Laoo" typeface="DokChampa"/>
+        <a:font script="Sinh" typeface="Iskoola Pota"/>
+        <a:font script="Mong" typeface="Mongolian Baiti"/>
+        <a:font script="Viet" typeface="Times New Roman"/>
+        <a:font script="Uigh" typeface="Microsoft Uighur"/>
+        <a:font script="Geor" typeface="Sylfaen"/>
+      </a:majorFont>
+      <a:minorFont>
+        <a:latin typeface="Arial"/>
+        <a:ea typeface=""/>
+        <a:cs typeface=""/>
+        <a:font script="Jpan" typeface="ＭＳ Ｐゴシック"/>
+        <a:font script="Hang" typeface="맑은 고딕"/>
+        <a:font script="Hans" typeface="宋体"/>
+        <a:font script="Hant" typeface="新細明體"/>
+        <a:font script="Arab" typeface="Arial"/>
+        <a:font script="Hebr" typeface="Arial"/>
+        <a:font script="Thai" typeface="Cordia New"/>
+        <a:font script="Ethi" typeface="Nyala"/>
+        <a:font script="Beng" typeface="Vrinda"/>
+        <a:font script="Gujr" typeface="Shruti"/>
+        <a:font script="Khmr" typeface="DaunPenh"/>
+        <a:font script="Knda" typeface="Tunga"/>
+        <a:font script="Guru" typeface="Raavi"/>
+        <a:font script="Cans" typeface="Euphemia"/>
+        <a:font script="Cher" typeface="Plantagenet Cherokee"/>
+        <a:font script="Yiii" typeface="Microsoft Yi Baiti"/>
+        <a:font script="Tibt" typeface="Microsoft Himalaya"/>
+        <a:font script="Thaa" typeface="MV Boli"/>
+        <a:font script="Deva" typeface="Mangal"/>
+        <a:font script="Telu" typeface="Gautami"/>
+        <a:font script="Taml" typeface="Latha"/>
+        <a:font script="Syrc" typeface="Estrangelo Edessa"/>
+        <a:font script="Orya" typeface="Kalinga"/>
+        <a:font script="Mlym" typeface="Kartika"/>
+        <a:font script="Laoo" typeface="DokChampa"/>
+        <a:font script="Sinh" typeface="Iskoola Pota"/>
+        <a:font script="Mong" typeface="Mongolian Baiti"/>
+        <a:font script="Viet" typeface="Arial"/>
+        <a:font script="Uigh" typeface="Microsoft Uighur"/>
+        <a:font script="Geor" typeface="Sylfaen"/>
+      </a:minorFont>
+    </a:fontScheme>
+    <a:fmtScheme name="Office">
+      <a:fillStyleLst>
+        <a:solidFill>
+          <a:schemeClr val="phClr"/>
+        </a:solidFill>
+        <a:gradFill rotWithShape="1">
+          <a:gsLst>
+            <a:gs pos="0">
+              <a:schemeClr val="phClr">
+                <a:tint val="50000"/>
+                <a:satMod val="300000"/>
+              </a:schemeClr>
+            </a:gs>
+            <a:gs pos="35000">
+              <a:schemeClr val="phClr">
+                <a:tint val="37000"/>
+                <a:satMod val="300000"/>
+              </a:schemeClr>
+            </a:gs>
+            <a:gs pos="100000">
+              <a:schemeClr val="phClr">
+                <a:tint val="15000"/>
+                <a:satMod val="350000"/>
+              </a:schemeClr>
+            </a:gs>
+          </a:gsLst>
+          <a:lin ang="16200000" scaled="1"/>
+        </a:gradFill>
+        <a:gradFill rotWithShape="1">
+          <a:gsLst>
+            <a:gs pos="0">
+              <a:schemeClr val="phClr">
+                <a:tint val="100000"/>
+                <a:shade val="100000"/>
+                <a:satMod val="130000"/>
+              </a:schemeClr>
+            </a:gs>
+            <a:gs pos="100000">
+              <a:schemeClr val="phClr">
+                <a:tint val="50000"/>
+                <a:shade val="100000"/>
+                <a:satMod val="350000"/>
+              </a:schemeClr>
+            </a:gs>
+          </a:gsLst>
+          <a:lin ang="16200000" scaled="0"/>
+        </a:gradFill>
+      </a:fillStyleLst>
+      <a:lnStyleLst>
+        <a:ln w="9525" cap="flat" cmpd="sng" algn="ctr">
+          <a:solidFill>
+            <a:schemeClr val="phClr">
+              <a:shade val="95000"/>
+              <a:satMod val="105000"/>
+            </a:schemeClr>
+          </a:solidFill>
+          <a:prstDash val="solid"/>
+        </a:ln>
+        <a:ln w="25400" cap="flat" cmpd="sng" algn="ctr">
+          <a:solidFill>
+            <a:schemeClr val="phClr"/>
+          </a:solidFill>
+          <a:prstDash val="solid"/>
+        </a:ln>
+        <a:ln w="38100" cap="flat" cmpd="sng" algn="ctr">
+          <a:solidFill>
+            <a:schemeClr val="phClr"/>
+          </a:solidFill>
+          <a:prstDash val="solid"/>
+        </a:ln>
+      </a:lnStyleLst>
+      <a:effectStyleLst>
+        <a:effectStyle>
+          <a:effectLst>
+            <a:outerShdw blurRad="40000" dist="20000" dir="5400000" rotWithShape="0">
+              <a:srgbClr val="000000">
+                <a:alpha val="38000"/>
+              </a:srgbClr>
+            </a:outerShdw>
+          </a:effectLst>
+        </a:effectStyle>
+        <a:effectStyle>
+          <a:effectLst>
+            <a:outerShdw blurRad="40000" dist="23000" dir="5400000" rotWithShape="0">
+              <a:srgbClr val="000000">
+                <a:alpha val="35000"/>
+              </a:srgbClr>
+            </a:outerShdw>
+          </a:effectLst>
+        </a:effectStyle>
+        <a:effectStyle>
+          <a:effectLst>
+            <a:outerShdw blurRad="40000" dist="23000" dir="5400000" rotWithShape="0">
+              <a:srgbClr val="000000">
+                <a:alpha val="35000"/>
+              </a:srgbClr>
+            </a:outerShdw>
+          </a:effectLst>
+          <a:scene3d>
+            <a:camera prst="orthographicFront">
+              <a:rot lat="0" lon="0" rev="0"/>
+            </a:camera>
+            <a:lightRig rig="threePt" dir="t">
+              <a:rot lat="0" lon="0" rev="1200000"/>
+            </a:lightRig>
+          </a:scene3d>
+          <a:sp3d>
+            <a:bevelT w="63500" h="25400"/>
+          </a:sp3d>
+        </a:effectStyle>
+      </a:effectStyleLst>
+      <a:bgFillStyleLst>
+        <a:solidFill>
+          <a:schemeClr val="phClr"/>
+        </a:solidFill>
+        <a:gradFill rotWithShape="1">
+          <a:gsLst>
+            <a:gs pos="0">
+              <a:schemeClr val="phClr">
+                <a:tint val="40000"/>
+                <a:satMod val="350000"/>
+              </a:schemeClr>
+            </a:gs>
+            <a:gs pos="40000">
+              <a:schemeClr val="phClr">
+                <a:tint val="45000"/>
+                <a:shade val="99000"/>
+                <a:satMod val="350000"/>
+              </a:schemeClr>
+            </a:gs>
+            <a:gs pos="100000">
+              <a:schemeClr val="phClr">
+                <a:shade val="20000"/>
+                <a:satMod val="255000"/>
+              </a:schemeClr>
+            </a:gs>
+          </a:gsLst>
+          <a:path path="circle">
+            <a:fillToRect l="50000" t="-80000" r="50000" b="180000"/>
+          </a:path>
+        </a:gradFill>
+        <a:gradFill rotWithShape="1">
+          <a:gsLst>
+            <a:gs pos="0">
+              <a:schemeClr val="phClr">
+                <a:tint val="80000"/>
+                <a:satMod val="300000"/>
+              </a:schemeClr>
+            </a:gs>
+            <a:gs pos="100000">
+              <a:schemeClr val="phClr">
+                <a:shade val="30000"/>
+                <a:satMod val="200000"/>
+              </a:schemeClr>
+            </a:gs>
+          </a:gsLst>
+          <a:path path="circle">
+            <a:fillToRect l="50000" t="50000" r="50000" b="50000"/>
+          </a:path>
+        </a:gradFill>
+      </a:bgFillStyleLst>
+    </a:fmtScheme>
+  </a:themeElements>
+  <a:objectDefaults/>
+  <a:extraClrSchemeLst/>
+</a:theme>
+</file>
+
+<file path=ppt/theme/theme2.xml><?xml version="1.0" encoding="utf-8"?>
+<a:theme xmlns:a="http://schemas.openxmlformats.org/drawingml/2006/main" name="Custom Theme">
   <a:themeElements>
     <a:clrScheme name="Default">
       <a:dk1>
@@ -6219,284 +6741,7 @@
       </a:bgFillStyleLst>
     </a:fmtScheme>
   </a:themeElements>
-</a:theme>
-</file>
-
-<file path=ppt/theme/theme2.xml><?xml version="1.0" encoding="utf-8"?>
-<a:theme xmlns:a="http://schemas.openxmlformats.org/drawingml/2006/main" xmlns:r="http://schemas.openxmlformats.org/officeDocument/2006/relationships" name="Paperback">
-  <a:themeElements>
-    <a:clrScheme name="Paperback">
-      <a:dk1>
-        <a:srgbClr val="000000"/>
-      </a:dk1>
-      <a:lt1>
-        <a:srgbClr val="FFFFFF"/>
-      </a:lt1>
-      <a:dk2>
-        <a:srgbClr val="00695C"/>
-      </a:dk2>
-      <a:lt2>
-        <a:srgbClr val="26A69A"/>
-      </a:lt2>
-      <a:accent1>
-        <a:srgbClr val="FFFBF0"/>
-      </a:accent1>
-      <a:accent2>
-        <a:srgbClr val="B7B7B7"/>
-      </a:accent2>
-      <a:accent3>
-        <a:srgbClr val="FB8C00"/>
-      </a:accent3>
-      <a:accent4>
-        <a:srgbClr val="80CBC4"/>
-      </a:accent4>
-      <a:accent5>
-        <a:srgbClr val="AF4345"/>
-      </a:accent5>
-      <a:accent6>
-        <a:srgbClr val="F58F8F"/>
-      </a:accent6>
-      <a:hlink>
-        <a:srgbClr val="AF4345"/>
-      </a:hlink>
-      <a:folHlink>
-        <a:srgbClr val="AF4345"/>
-      </a:folHlink>
-    </a:clrScheme>
-    <a:fontScheme name="Office">
-      <a:majorFont>
-        <a:latin typeface="Arial"/>
-        <a:ea typeface=""/>
-        <a:cs typeface=""/>
-        <a:font script="Jpan" typeface="ＭＳ Ｐゴシック"/>
-        <a:font script="Hang" typeface="맑은 고딕"/>
-        <a:font script="Hans" typeface="宋体"/>
-        <a:font script="Hant" typeface="新細明體"/>
-        <a:font script="Arab" typeface="Times New Roman"/>
-        <a:font script="Hebr" typeface="Times New Roman"/>
-        <a:font script="Thai" typeface="Angsana New"/>
-        <a:font script="Ethi" typeface="Nyala"/>
-        <a:font script="Beng" typeface="Vrinda"/>
-        <a:font script="Gujr" typeface="Shruti"/>
-        <a:font script="Khmr" typeface="MoolBoran"/>
-        <a:font script="Knda" typeface="Tunga"/>
-        <a:font script="Guru" typeface="Raavi"/>
-        <a:font script="Cans" typeface="Euphemia"/>
-        <a:font script="Cher" typeface="Plantagenet Cherokee"/>
-        <a:font script="Yiii" typeface="Microsoft Yi Baiti"/>
-        <a:font script="Tibt" typeface="Microsoft Himalaya"/>
-        <a:font script="Thaa" typeface="MV Boli"/>
-        <a:font script="Deva" typeface="Mangal"/>
-        <a:font script="Telu" typeface="Gautami"/>
-        <a:font script="Taml" typeface="Latha"/>
-        <a:font script="Syrc" typeface="Estrangelo Edessa"/>
-        <a:font script="Orya" typeface="Kalinga"/>
-        <a:font script="Mlym" typeface="Kartika"/>
-        <a:font script="Laoo" typeface="DokChampa"/>
-        <a:font script="Sinh" typeface="Iskoola Pota"/>
-        <a:font script="Mong" typeface="Mongolian Baiti"/>
-        <a:font script="Viet" typeface="Times New Roman"/>
-        <a:font script="Uigh" typeface="Microsoft Uighur"/>
-        <a:font script="Geor" typeface="Sylfaen"/>
-      </a:majorFont>
-      <a:minorFont>
-        <a:latin typeface="Arial"/>
-        <a:ea typeface=""/>
-        <a:cs typeface=""/>
-        <a:font script="Jpan" typeface="ＭＳ Ｐゴシック"/>
-        <a:font script="Hang" typeface="맑은 고딕"/>
-        <a:font script="Hans" typeface="宋体"/>
-        <a:font script="Hant" typeface="新細明體"/>
-        <a:font script="Arab" typeface="Arial"/>
-        <a:font script="Hebr" typeface="Arial"/>
-        <a:font script="Thai" typeface="Cordia New"/>
-        <a:font script="Ethi" typeface="Nyala"/>
-        <a:font script="Beng" typeface="Vrinda"/>
-        <a:font script="Gujr" typeface="Shruti"/>
-        <a:font script="Khmr" typeface="DaunPenh"/>
-        <a:font script="Knda" typeface="Tunga"/>
-        <a:font script="Guru" typeface="Raavi"/>
-        <a:font script="Cans" typeface="Euphemia"/>
-        <a:font script="Cher" typeface="Plantagenet Cherokee"/>
-        <a:font script="Yiii" typeface="Microsoft Yi Baiti"/>
-        <a:font script="Tibt" typeface="Microsoft Himalaya"/>
-        <a:font script="Thaa" typeface="MV Boli"/>
-        <a:font script="Deva" typeface="Mangal"/>
-        <a:font script="Telu" typeface="Gautami"/>
-        <a:font script="Taml" typeface="Latha"/>
-        <a:font script="Syrc" typeface="Estrangelo Edessa"/>
-        <a:font script="Orya" typeface="Kalinga"/>
-        <a:font script="Mlym" typeface="Kartika"/>
-        <a:font script="Laoo" typeface="DokChampa"/>
-        <a:font script="Sinh" typeface="Iskoola Pota"/>
-        <a:font script="Mong" typeface="Mongolian Baiti"/>
-        <a:font script="Viet" typeface="Arial"/>
-        <a:font script="Uigh" typeface="Microsoft Uighur"/>
-        <a:font script="Geor" typeface="Sylfaen"/>
-      </a:minorFont>
-    </a:fontScheme>
-    <a:fmtScheme name="Office">
-      <a:fillStyleLst>
-        <a:solidFill>
-          <a:schemeClr val="phClr"/>
-        </a:solidFill>
-        <a:gradFill rotWithShape="1">
-          <a:gsLst>
-            <a:gs pos="0">
-              <a:schemeClr val="phClr">
-                <a:tint val="50000"/>
-                <a:satMod val="300000"/>
-              </a:schemeClr>
-            </a:gs>
-            <a:gs pos="35000">
-              <a:schemeClr val="phClr">
-                <a:tint val="37000"/>
-                <a:satMod val="300000"/>
-              </a:schemeClr>
-            </a:gs>
-            <a:gs pos="100000">
-              <a:schemeClr val="phClr">
-                <a:tint val="15000"/>
-                <a:satMod val="350000"/>
-              </a:schemeClr>
-            </a:gs>
-          </a:gsLst>
-          <a:lin ang="16200000" scaled="1"/>
-        </a:gradFill>
-        <a:gradFill rotWithShape="1">
-          <a:gsLst>
-            <a:gs pos="0">
-              <a:schemeClr val="phClr">
-                <a:tint val="100000"/>
-                <a:shade val="100000"/>
-                <a:satMod val="130000"/>
-              </a:schemeClr>
-            </a:gs>
-            <a:gs pos="100000">
-              <a:schemeClr val="phClr">
-                <a:tint val="50000"/>
-                <a:shade val="100000"/>
-                <a:satMod val="350000"/>
-              </a:schemeClr>
-            </a:gs>
-          </a:gsLst>
-          <a:lin ang="16200000" scaled="0"/>
-        </a:gradFill>
-      </a:fillStyleLst>
-      <a:lnStyleLst>
-        <a:ln w="9525" cap="flat" cmpd="sng" algn="ctr">
-          <a:solidFill>
-            <a:schemeClr val="phClr">
-              <a:shade val="95000"/>
-              <a:satMod val="105000"/>
-            </a:schemeClr>
-          </a:solidFill>
-          <a:prstDash val="solid"/>
-        </a:ln>
-        <a:ln w="25400" cap="flat" cmpd="sng" algn="ctr">
-          <a:solidFill>
-            <a:schemeClr val="phClr"/>
-          </a:solidFill>
-          <a:prstDash val="solid"/>
-        </a:ln>
-        <a:ln w="38100" cap="flat" cmpd="sng" algn="ctr">
-          <a:solidFill>
-            <a:schemeClr val="phClr"/>
-          </a:solidFill>
-          <a:prstDash val="solid"/>
-        </a:ln>
-      </a:lnStyleLst>
-      <a:effectStyleLst>
-        <a:effectStyle>
-          <a:effectLst>
-            <a:outerShdw blurRad="40000" dist="20000" dir="5400000" rotWithShape="0">
-              <a:srgbClr val="000000">
-                <a:alpha val="38000"/>
-              </a:srgbClr>
-            </a:outerShdw>
-          </a:effectLst>
-        </a:effectStyle>
-        <a:effectStyle>
-          <a:effectLst>
-            <a:outerShdw blurRad="40000" dist="23000" dir="5400000" rotWithShape="0">
-              <a:srgbClr val="000000">
-                <a:alpha val="35000"/>
-              </a:srgbClr>
-            </a:outerShdw>
-          </a:effectLst>
-        </a:effectStyle>
-        <a:effectStyle>
-          <a:effectLst>
-            <a:outerShdw blurRad="40000" dist="23000" dir="5400000" rotWithShape="0">
-              <a:srgbClr val="000000">
-                <a:alpha val="35000"/>
-              </a:srgbClr>
-            </a:outerShdw>
-          </a:effectLst>
-          <a:scene3d>
-            <a:camera prst="orthographicFront">
-              <a:rot lat="0" lon="0" rev="0"/>
-            </a:camera>
-            <a:lightRig rig="threePt" dir="t">
-              <a:rot lat="0" lon="0" rev="1200000"/>
-            </a:lightRig>
-          </a:scene3d>
-          <a:sp3d>
-            <a:bevelT w="63500" h="25400"/>
-          </a:sp3d>
-        </a:effectStyle>
-      </a:effectStyleLst>
-      <a:bgFillStyleLst>
-        <a:solidFill>
-          <a:schemeClr val="phClr"/>
-        </a:solidFill>
-        <a:gradFill rotWithShape="1">
-          <a:gsLst>
-            <a:gs pos="0">
-              <a:schemeClr val="phClr">
-                <a:tint val="40000"/>
-                <a:satMod val="350000"/>
-              </a:schemeClr>
-            </a:gs>
-            <a:gs pos="40000">
-              <a:schemeClr val="phClr">
-                <a:tint val="45000"/>
-                <a:shade val="99000"/>
-                <a:satMod val="350000"/>
-              </a:schemeClr>
-            </a:gs>
-            <a:gs pos="100000">
-              <a:schemeClr val="phClr">
-                <a:shade val="20000"/>
-                <a:satMod val="255000"/>
-              </a:schemeClr>
-            </a:gs>
-          </a:gsLst>
-          <a:path path="circle">
-            <a:fillToRect l="50000" t="-80000" r="50000" b="180000"/>
-          </a:path>
-        </a:gradFill>
-        <a:gradFill rotWithShape="1">
-          <a:gsLst>
-            <a:gs pos="0">
-              <a:schemeClr val="phClr">
-                <a:tint val="80000"/>
-                <a:satMod val="300000"/>
-              </a:schemeClr>
-            </a:gs>
-            <a:gs pos="100000">
-              <a:schemeClr val="phClr">
-                <a:shade val="30000"/>
-                <a:satMod val="200000"/>
-              </a:schemeClr>
-            </a:gs>
-          </a:gsLst>
-          <a:path path="circle">
-            <a:fillToRect l="50000" t="50000" r="50000" b="50000"/>
-          </a:path>
-        </a:gradFill>
-      </a:bgFillStyleLst>
-    </a:fmtScheme>
-  </a:themeElements>
+  <a:objectDefaults/>
+  <a:extraClrSchemeLst/>
 </a:theme>
 </file>
</xml_diff>